<commit_message>
[Docs] update overview chart (#15415)
* update overview chart

* update description

* punctuation
</commit_message>
<xml_diff>
--- a/doc/img/architectural-chart.pptx
+++ b/doc/img/architectural-chart.pptx
@@ -6,6 +6,7 @@
   </p:sldMasterIdLst>
   <p:sldIdLst>
     <p:sldId id="256" r:id="rId2"/>
+    <p:sldId id="257" r:id="rId3"/>
   </p:sldIdLst>
   <p:sldSz cx="12192000" cy="6858000"/>
   <p:notesSz cx="6858000" cy="9144000"/>
@@ -183,35 +184,35 @@
               <a:buNone/>
               <a:defRPr sz="2400"/>
             </a:lvl1pPr>
-            <a:lvl2pPr marL="457200" indent="0" algn="ctr">
+            <a:lvl2pPr marL="457206" indent="0" algn="ctr">
               <a:buNone/>
               <a:defRPr sz="2000"/>
             </a:lvl2pPr>
-            <a:lvl3pPr marL="914400" indent="0" algn="ctr">
+            <a:lvl3pPr marL="914411" indent="0" algn="ctr">
               <a:buNone/>
               <a:defRPr sz="1800"/>
             </a:lvl3pPr>
-            <a:lvl4pPr marL="1371600" indent="0" algn="ctr">
+            <a:lvl4pPr marL="1371617" indent="0" algn="ctr">
               <a:buNone/>
               <a:defRPr sz="1600"/>
             </a:lvl4pPr>
-            <a:lvl5pPr marL="1828800" indent="0" algn="ctr">
+            <a:lvl5pPr marL="1828823" indent="0" algn="ctr">
               <a:buNone/>
               <a:defRPr sz="1600"/>
             </a:lvl5pPr>
-            <a:lvl6pPr marL="2286000" indent="0" algn="ctr">
+            <a:lvl6pPr marL="2286029" indent="0" algn="ctr">
               <a:buNone/>
               <a:defRPr sz="1600"/>
             </a:lvl6pPr>
-            <a:lvl7pPr marL="2743200" indent="0" algn="ctr">
+            <a:lvl7pPr marL="2743234" indent="0" algn="ctr">
               <a:buNone/>
               <a:defRPr sz="1600"/>
             </a:lvl7pPr>
-            <a:lvl8pPr marL="3200400" indent="0" algn="ctr">
+            <a:lvl8pPr marL="3200440" indent="0" algn="ctr">
               <a:buNone/>
               <a:defRPr sz="1600"/>
             </a:lvl8pPr>
-            <a:lvl9pPr marL="3657600" indent="0" algn="ctr">
+            <a:lvl9pPr marL="3657646" indent="0" algn="ctr">
               <a:buNone/>
               <a:defRPr sz="1600"/>
             </a:lvl9pPr>
@@ -241,9 +242,9 @@
           <a:p>
             <a:fld id="{F4618184-AC6B-4EC8-A593-7F91D186A496}" type="datetimeFigureOut">
               <a:rPr lang="de-DE" smtClean="0"/>
-              <a:t>21.04.2021</a:t>
+              <a:t>21.06.2023</a:t>
             </a:fld>
-            <a:endParaRPr lang="de-DE"/>
+            <a:endParaRPr lang="de-DE" dirty="0"/>
           </a:p>
         </p:txBody>
       </p:sp>
@@ -262,7 +263,7 @@
           <a:bodyPr/>
           <a:lstStyle/>
           <a:p>
-            <a:endParaRPr lang="de-DE"/>
+            <a:endParaRPr lang="de-DE" dirty="0"/>
           </a:p>
         </p:txBody>
       </p:sp>
@@ -283,9 +284,9 @@
           <a:p>
             <a:fld id="{A34684FD-1E56-4A97-950B-0E8E25D0F5ED}" type="slidenum">
               <a:rPr lang="de-DE" smtClean="0"/>
-              <a:t>‹Nr.›</a:t>
+              <a:t>‹#›</a:t>
             </a:fld>
-            <a:endParaRPr lang="de-DE"/>
+            <a:endParaRPr lang="de-DE" dirty="0"/>
           </a:p>
         </p:txBody>
       </p:sp>
@@ -409,9 +410,9 @@
           <a:p>
             <a:fld id="{F4618184-AC6B-4EC8-A593-7F91D186A496}" type="datetimeFigureOut">
               <a:rPr lang="de-DE" smtClean="0"/>
-              <a:t>21.04.2021</a:t>
+              <a:t>21.06.2023</a:t>
             </a:fld>
-            <a:endParaRPr lang="de-DE"/>
+            <a:endParaRPr lang="de-DE" dirty="0"/>
           </a:p>
         </p:txBody>
       </p:sp>
@@ -430,7 +431,7 @@
           <a:bodyPr/>
           <a:lstStyle/>
           <a:p>
-            <a:endParaRPr lang="de-DE"/>
+            <a:endParaRPr lang="de-DE" dirty="0"/>
           </a:p>
         </p:txBody>
       </p:sp>
@@ -451,9 +452,9 @@
           <a:p>
             <a:fld id="{A34684FD-1E56-4A97-950B-0E8E25D0F5ED}" type="slidenum">
               <a:rPr lang="de-DE" smtClean="0"/>
-              <a:t>‹Nr.›</a:t>
+              <a:t>‹#›</a:t>
             </a:fld>
-            <a:endParaRPr lang="de-DE"/>
+            <a:endParaRPr lang="de-DE" dirty="0"/>
           </a:p>
         </p:txBody>
       </p:sp>
@@ -499,7 +500,7 @@
         </p:nvSpPr>
         <p:spPr>
           <a:xfrm>
-            <a:off x="8724900" y="365125"/>
+            <a:off x="8724899" y="365125"/>
             <a:ext cx="2628900" cy="5811838"/>
           </a:xfrm>
         </p:spPr>
@@ -526,7 +527,7 @@
         </p:nvSpPr>
         <p:spPr>
           <a:xfrm>
-            <a:off x="838200" y="365125"/>
+            <a:off x="838199" y="365125"/>
             <a:ext cx="7734300" cy="5811838"/>
           </a:xfrm>
         </p:spPr>
@@ -587,9 +588,9 @@
           <a:p>
             <a:fld id="{F4618184-AC6B-4EC8-A593-7F91D186A496}" type="datetimeFigureOut">
               <a:rPr lang="de-DE" smtClean="0"/>
-              <a:t>21.04.2021</a:t>
+              <a:t>21.06.2023</a:t>
             </a:fld>
-            <a:endParaRPr lang="de-DE"/>
+            <a:endParaRPr lang="de-DE" dirty="0"/>
           </a:p>
         </p:txBody>
       </p:sp>
@@ -608,7 +609,7 @@
           <a:bodyPr/>
           <a:lstStyle/>
           <a:p>
-            <a:endParaRPr lang="de-DE"/>
+            <a:endParaRPr lang="de-DE" dirty="0"/>
           </a:p>
         </p:txBody>
       </p:sp>
@@ -629,9 +630,9 @@
           <a:p>
             <a:fld id="{A34684FD-1E56-4A97-950B-0E8E25D0F5ED}" type="slidenum">
               <a:rPr lang="de-DE" smtClean="0"/>
-              <a:t>‹Nr.›</a:t>
+              <a:t>‹#›</a:t>
             </a:fld>
-            <a:endParaRPr lang="de-DE"/>
+            <a:endParaRPr lang="de-DE" dirty="0"/>
           </a:p>
         </p:txBody>
       </p:sp>
@@ -755,9 +756,9 @@
           <a:p>
             <a:fld id="{F4618184-AC6B-4EC8-A593-7F91D186A496}" type="datetimeFigureOut">
               <a:rPr lang="de-DE" smtClean="0"/>
-              <a:t>21.04.2021</a:t>
+              <a:t>21.06.2023</a:t>
             </a:fld>
-            <a:endParaRPr lang="de-DE"/>
+            <a:endParaRPr lang="de-DE" dirty="0"/>
           </a:p>
         </p:txBody>
       </p:sp>
@@ -776,7 +777,7 @@
           <a:bodyPr/>
           <a:lstStyle/>
           <a:p>
-            <a:endParaRPr lang="de-DE"/>
+            <a:endParaRPr lang="de-DE" dirty="0"/>
           </a:p>
         </p:txBody>
       </p:sp>
@@ -797,9 +798,9 @@
           <a:p>
             <a:fld id="{A34684FD-1E56-4A97-950B-0E8E25D0F5ED}" type="slidenum">
               <a:rPr lang="de-DE" smtClean="0"/>
-              <a:t>‹Nr.›</a:t>
+              <a:t>‹#›</a:t>
             </a:fld>
-            <a:endParaRPr lang="de-DE"/>
+            <a:endParaRPr lang="de-DE" dirty="0"/>
           </a:p>
         </p:txBody>
       </p:sp>
@@ -845,7 +846,7 @@
         </p:nvSpPr>
         <p:spPr>
           <a:xfrm>
-            <a:off x="831850" y="1709738"/>
+            <a:off x="831852" y="1709738"/>
             <a:ext cx="10515600" cy="2852737"/>
           </a:xfrm>
         </p:spPr>
@@ -876,7 +877,7 @@
         </p:nvSpPr>
         <p:spPr>
           <a:xfrm>
-            <a:off x="831850" y="4589463"/>
+            <a:off x="831852" y="4589464"/>
             <a:ext cx="10515600" cy="1500187"/>
           </a:xfrm>
         </p:spPr>
@@ -893,7 +894,7 @@
                 </a:solidFill>
               </a:defRPr>
             </a:lvl1pPr>
-            <a:lvl2pPr marL="457200" indent="0">
+            <a:lvl2pPr marL="457206" indent="0">
               <a:buNone/>
               <a:defRPr sz="2000">
                 <a:solidFill>
@@ -903,7 +904,7 @@
                 </a:solidFill>
               </a:defRPr>
             </a:lvl2pPr>
-            <a:lvl3pPr marL="914400" indent="0">
+            <a:lvl3pPr marL="914411" indent="0">
               <a:buNone/>
               <a:defRPr sz="1800">
                 <a:solidFill>
@@ -913,7 +914,7 @@
                 </a:solidFill>
               </a:defRPr>
             </a:lvl3pPr>
-            <a:lvl4pPr marL="1371600" indent="0">
+            <a:lvl4pPr marL="1371617" indent="0">
               <a:buNone/>
               <a:defRPr sz="1600">
                 <a:solidFill>
@@ -923,7 +924,7 @@
                 </a:solidFill>
               </a:defRPr>
             </a:lvl4pPr>
-            <a:lvl5pPr marL="1828800" indent="0">
+            <a:lvl5pPr marL="1828823" indent="0">
               <a:buNone/>
               <a:defRPr sz="1600">
                 <a:solidFill>
@@ -933,7 +934,7 @@
                 </a:solidFill>
               </a:defRPr>
             </a:lvl5pPr>
-            <a:lvl6pPr marL="2286000" indent="0">
+            <a:lvl6pPr marL="2286029" indent="0">
               <a:buNone/>
               <a:defRPr sz="1600">
                 <a:solidFill>
@@ -943,7 +944,7 @@
                 </a:solidFill>
               </a:defRPr>
             </a:lvl6pPr>
-            <a:lvl7pPr marL="2743200" indent="0">
+            <a:lvl7pPr marL="2743234" indent="0">
               <a:buNone/>
               <a:defRPr sz="1600">
                 <a:solidFill>
@@ -953,7 +954,7 @@
                 </a:solidFill>
               </a:defRPr>
             </a:lvl7pPr>
-            <a:lvl8pPr marL="3200400" indent="0">
+            <a:lvl8pPr marL="3200440" indent="0">
               <a:buNone/>
               <a:defRPr sz="1600">
                 <a:solidFill>
@@ -963,7 +964,7 @@
                 </a:solidFill>
               </a:defRPr>
             </a:lvl8pPr>
-            <a:lvl9pPr marL="3657600" indent="0">
+            <a:lvl9pPr marL="3657646" indent="0">
               <a:buNone/>
               <a:defRPr sz="1600">
                 <a:solidFill>
@@ -1000,9 +1001,9 @@
           <a:p>
             <a:fld id="{F4618184-AC6B-4EC8-A593-7F91D186A496}" type="datetimeFigureOut">
               <a:rPr lang="de-DE" smtClean="0"/>
-              <a:t>21.04.2021</a:t>
+              <a:t>21.06.2023</a:t>
             </a:fld>
-            <a:endParaRPr lang="de-DE"/>
+            <a:endParaRPr lang="de-DE" dirty="0"/>
           </a:p>
         </p:txBody>
       </p:sp>
@@ -1021,7 +1022,7 @@
           <a:bodyPr/>
           <a:lstStyle/>
           <a:p>
-            <a:endParaRPr lang="de-DE"/>
+            <a:endParaRPr lang="de-DE" dirty="0"/>
           </a:p>
         </p:txBody>
       </p:sp>
@@ -1042,9 +1043,9 @@
           <a:p>
             <a:fld id="{A34684FD-1E56-4A97-950B-0E8E25D0F5ED}" type="slidenum">
               <a:rPr lang="de-DE" smtClean="0"/>
-              <a:t>‹Nr.›</a:t>
+              <a:t>‹#›</a:t>
             </a:fld>
-            <a:endParaRPr lang="de-DE"/>
+            <a:endParaRPr lang="de-DE" dirty="0"/>
           </a:p>
         </p:txBody>
       </p:sp>
@@ -1112,7 +1113,7 @@
         </p:nvSpPr>
         <p:spPr>
           <a:xfrm>
-            <a:off x="838200" y="1825625"/>
+            <a:off x="838201" y="1825625"/>
             <a:ext cx="5181600" cy="4351338"/>
           </a:xfrm>
         </p:spPr>
@@ -1168,7 +1169,7 @@
         </p:nvSpPr>
         <p:spPr>
           <a:xfrm>
-            <a:off x="6172200" y="1825625"/>
+            <a:off x="6172201" y="1825625"/>
             <a:ext cx="5181600" cy="4351338"/>
           </a:xfrm>
         </p:spPr>
@@ -1229,9 +1230,9 @@
           <a:p>
             <a:fld id="{F4618184-AC6B-4EC8-A593-7F91D186A496}" type="datetimeFigureOut">
               <a:rPr lang="de-DE" smtClean="0"/>
-              <a:t>21.04.2021</a:t>
+              <a:t>21.06.2023</a:t>
             </a:fld>
-            <a:endParaRPr lang="de-DE"/>
+            <a:endParaRPr lang="de-DE" dirty="0"/>
           </a:p>
         </p:txBody>
       </p:sp>
@@ -1250,7 +1251,7 @@
           <a:bodyPr/>
           <a:lstStyle/>
           <a:p>
-            <a:endParaRPr lang="de-DE"/>
+            <a:endParaRPr lang="de-DE" dirty="0"/>
           </a:p>
         </p:txBody>
       </p:sp>
@@ -1271,9 +1272,9 @@
           <a:p>
             <a:fld id="{A34684FD-1E56-4A97-950B-0E8E25D0F5ED}" type="slidenum">
               <a:rPr lang="de-DE" smtClean="0"/>
-              <a:t>‹Nr.›</a:t>
+              <a:t>‹#›</a:t>
             </a:fld>
-            <a:endParaRPr lang="de-DE"/>
+            <a:endParaRPr lang="de-DE" dirty="0"/>
           </a:p>
         </p:txBody>
       </p:sp>
@@ -1319,7 +1320,7 @@
         </p:nvSpPr>
         <p:spPr>
           <a:xfrm>
-            <a:off x="839788" y="365125"/>
+            <a:off x="839789" y="365125"/>
             <a:ext cx="10515600" cy="1325563"/>
           </a:xfrm>
         </p:spPr>
@@ -1346,7 +1347,7 @@
         </p:nvSpPr>
         <p:spPr>
           <a:xfrm>
-            <a:off x="839788" y="1681163"/>
+            <a:off x="839789" y="1681163"/>
             <a:ext cx="5157787" cy="823912"/>
           </a:xfrm>
         </p:spPr>
@@ -1357,35 +1358,35 @@
               <a:buNone/>
               <a:defRPr sz="2400" b="1"/>
             </a:lvl1pPr>
-            <a:lvl2pPr marL="457200" indent="0">
+            <a:lvl2pPr marL="457206" indent="0">
               <a:buNone/>
               <a:defRPr sz="2000" b="1"/>
             </a:lvl2pPr>
-            <a:lvl3pPr marL="914400" indent="0">
+            <a:lvl3pPr marL="914411" indent="0">
               <a:buNone/>
               <a:defRPr sz="1800" b="1"/>
             </a:lvl3pPr>
-            <a:lvl4pPr marL="1371600" indent="0">
+            <a:lvl4pPr marL="1371617" indent="0">
               <a:buNone/>
               <a:defRPr sz="1600" b="1"/>
             </a:lvl4pPr>
-            <a:lvl5pPr marL="1828800" indent="0">
+            <a:lvl5pPr marL="1828823" indent="0">
               <a:buNone/>
               <a:defRPr sz="1600" b="1"/>
             </a:lvl5pPr>
-            <a:lvl6pPr marL="2286000" indent="0">
+            <a:lvl6pPr marL="2286029" indent="0">
               <a:buNone/>
               <a:defRPr sz="1600" b="1"/>
             </a:lvl6pPr>
-            <a:lvl7pPr marL="2743200" indent="0">
+            <a:lvl7pPr marL="2743234" indent="0">
               <a:buNone/>
               <a:defRPr sz="1600" b="1"/>
             </a:lvl7pPr>
-            <a:lvl8pPr marL="3200400" indent="0">
+            <a:lvl8pPr marL="3200440" indent="0">
               <a:buNone/>
               <a:defRPr sz="1600" b="1"/>
             </a:lvl8pPr>
-            <a:lvl9pPr marL="3657600" indent="0">
+            <a:lvl9pPr marL="3657646" indent="0">
               <a:buNone/>
               <a:defRPr sz="1600" b="1"/>
             </a:lvl9pPr>
@@ -1411,7 +1412,7 @@
         </p:nvSpPr>
         <p:spPr>
           <a:xfrm>
-            <a:off x="839788" y="2505075"/>
+            <a:off x="839789" y="2505076"/>
             <a:ext cx="5157787" cy="3684588"/>
           </a:xfrm>
         </p:spPr>
@@ -1467,7 +1468,7 @@
         </p:nvSpPr>
         <p:spPr>
           <a:xfrm>
-            <a:off x="6172200" y="1681163"/>
+            <a:off x="6172202" y="1681163"/>
             <a:ext cx="5183188" cy="823912"/>
           </a:xfrm>
         </p:spPr>
@@ -1478,35 +1479,35 @@
               <a:buNone/>
               <a:defRPr sz="2400" b="1"/>
             </a:lvl1pPr>
-            <a:lvl2pPr marL="457200" indent="0">
+            <a:lvl2pPr marL="457206" indent="0">
               <a:buNone/>
               <a:defRPr sz="2000" b="1"/>
             </a:lvl2pPr>
-            <a:lvl3pPr marL="914400" indent="0">
+            <a:lvl3pPr marL="914411" indent="0">
               <a:buNone/>
               <a:defRPr sz="1800" b="1"/>
             </a:lvl3pPr>
-            <a:lvl4pPr marL="1371600" indent="0">
+            <a:lvl4pPr marL="1371617" indent="0">
               <a:buNone/>
               <a:defRPr sz="1600" b="1"/>
             </a:lvl4pPr>
-            <a:lvl5pPr marL="1828800" indent="0">
+            <a:lvl5pPr marL="1828823" indent="0">
               <a:buNone/>
               <a:defRPr sz="1600" b="1"/>
             </a:lvl5pPr>
-            <a:lvl6pPr marL="2286000" indent="0">
+            <a:lvl6pPr marL="2286029" indent="0">
               <a:buNone/>
               <a:defRPr sz="1600" b="1"/>
             </a:lvl6pPr>
-            <a:lvl7pPr marL="2743200" indent="0">
+            <a:lvl7pPr marL="2743234" indent="0">
               <a:buNone/>
               <a:defRPr sz="1600" b="1"/>
             </a:lvl7pPr>
-            <a:lvl8pPr marL="3200400" indent="0">
+            <a:lvl8pPr marL="3200440" indent="0">
               <a:buNone/>
               <a:defRPr sz="1600" b="1"/>
             </a:lvl8pPr>
-            <a:lvl9pPr marL="3657600" indent="0">
+            <a:lvl9pPr marL="3657646" indent="0">
               <a:buNone/>
               <a:defRPr sz="1600" b="1"/>
             </a:lvl9pPr>
@@ -1532,7 +1533,7 @@
         </p:nvSpPr>
         <p:spPr>
           <a:xfrm>
-            <a:off x="6172200" y="2505075"/>
+            <a:off x="6172202" y="2505076"/>
             <a:ext cx="5183188" cy="3684588"/>
           </a:xfrm>
         </p:spPr>
@@ -1593,9 +1594,9 @@
           <a:p>
             <a:fld id="{F4618184-AC6B-4EC8-A593-7F91D186A496}" type="datetimeFigureOut">
               <a:rPr lang="de-DE" smtClean="0"/>
-              <a:t>21.04.2021</a:t>
+              <a:t>21.06.2023</a:t>
             </a:fld>
-            <a:endParaRPr lang="de-DE"/>
+            <a:endParaRPr lang="de-DE" dirty="0"/>
           </a:p>
         </p:txBody>
       </p:sp>
@@ -1614,7 +1615,7 @@
           <a:bodyPr/>
           <a:lstStyle/>
           <a:p>
-            <a:endParaRPr lang="de-DE"/>
+            <a:endParaRPr lang="de-DE" dirty="0"/>
           </a:p>
         </p:txBody>
       </p:sp>
@@ -1635,9 +1636,9 @@
           <a:p>
             <a:fld id="{A34684FD-1E56-4A97-950B-0E8E25D0F5ED}" type="slidenum">
               <a:rPr lang="de-DE" smtClean="0"/>
-              <a:t>‹Nr.›</a:t>
+              <a:t>‹#›</a:t>
             </a:fld>
-            <a:endParaRPr lang="de-DE"/>
+            <a:endParaRPr lang="de-DE" dirty="0"/>
           </a:p>
         </p:txBody>
       </p:sp>
@@ -1710,9 +1711,9 @@
           <a:p>
             <a:fld id="{F4618184-AC6B-4EC8-A593-7F91D186A496}" type="datetimeFigureOut">
               <a:rPr lang="de-DE" smtClean="0"/>
-              <a:t>21.04.2021</a:t>
+              <a:t>21.06.2023</a:t>
             </a:fld>
-            <a:endParaRPr lang="de-DE"/>
+            <a:endParaRPr lang="de-DE" dirty="0"/>
           </a:p>
         </p:txBody>
       </p:sp>
@@ -1731,7 +1732,7 @@
           <a:bodyPr/>
           <a:lstStyle/>
           <a:p>
-            <a:endParaRPr lang="de-DE"/>
+            <a:endParaRPr lang="de-DE" dirty="0"/>
           </a:p>
         </p:txBody>
       </p:sp>
@@ -1752,9 +1753,9 @@
           <a:p>
             <a:fld id="{A34684FD-1E56-4A97-950B-0E8E25D0F5ED}" type="slidenum">
               <a:rPr lang="de-DE" smtClean="0"/>
-              <a:t>‹Nr.›</a:t>
+              <a:t>‹#›</a:t>
             </a:fld>
-            <a:endParaRPr lang="de-DE"/>
+            <a:endParaRPr lang="de-DE" dirty="0"/>
           </a:p>
         </p:txBody>
       </p:sp>
@@ -1805,9 +1806,9 @@
           <a:p>
             <a:fld id="{F4618184-AC6B-4EC8-A593-7F91D186A496}" type="datetimeFigureOut">
               <a:rPr lang="de-DE" smtClean="0"/>
-              <a:t>21.04.2021</a:t>
+              <a:t>21.06.2023</a:t>
             </a:fld>
-            <a:endParaRPr lang="de-DE"/>
+            <a:endParaRPr lang="de-DE" dirty="0"/>
           </a:p>
         </p:txBody>
       </p:sp>
@@ -1826,7 +1827,7 @@
           <a:bodyPr/>
           <a:lstStyle/>
           <a:p>
-            <a:endParaRPr lang="de-DE"/>
+            <a:endParaRPr lang="de-DE" dirty="0"/>
           </a:p>
         </p:txBody>
       </p:sp>
@@ -1847,9 +1848,9 @@
           <a:p>
             <a:fld id="{A34684FD-1E56-4A97-950B-0E8E25D0F5ED}" type="slidenum">
               <a:rPr lang="de-DE" smtClean="0"/>
-              <a:t>‹Nr.›</a:t>
+              <a:t>‹#›</a:t>
             </a:fld>
-            <a:endParaRPr lang="de-DE"/>
+            <a:endParaRPr lang="de-DE" dirty="0"/>
           </a:p>
         </p:txBody>
       </p:sp>
@@ -1895,8 +1896,8 @@
         </p:nvSpPr>
         <p:spPr>
           <a:xfrm>
-            <a:off x="839788" y="457200"/>
-            <a:ext cx="3932237" cy="1600200"/>
+            <a:off x="839790" y="457200"/>
+            <a:ext cx="3932236" cy="1600200"/>
           </a:xfrm>
         </p:spPr>
         <p:txBody>
@@ -1927,7 +1928,7 @@
         <p:spPr>
           <a:xfrm>
             <a:off x="5183188" y="987425"/>
-            <a:ext cx="6172200" cy="4873625"/>
+            <a:ext cx="6172201" cy="4873625"/>
           </a:xfrm>
         </p:spPr>
         <p:txBody>
@@ -2010,8 +2011,8 @@
         </p:nvSpPr>
         <p:spPr>
           <a:xfrm>
-            <a:off x="839788" y="2057400"/>
-            <a:ext cx="3932237" cy="3811588"/>
+            <a:off x="839790" y="2057400"/>
+            <a:ext cx="3932236" cy="3811588"/>
           </a:xfrm>
         </p:spPr>
         <p:txBody>
@@ -2021,35 +2022,35 @@
               <a:buNone/>
               <a:defRPr sz="1600"/>
             </a:lvl1pPr>
-            <a:lvl2pPr marL="457200" indent="0">
+            <a:lvl2pPr marL="457206" indent="0">
               <a:buNone/>
               <a:defRPr sz="1400"/>
             </a:lvl2pPr>
-            <a:lvl3pPr marL="914400" indent="0">
+            <a:lvl3pPr marL="914411" indent="0">
               <a:buNone/>
               <a:defRPr sz="1200"/>
             </a:lvl3pPr>
-            <a:lvl4pPr marL="1371600" indent="0">
+            <a:lvl4pPr marL="1371617" indent="0">
               <a:buNone/>
               <a:defRPr sz="1000"/>
             </a:lvl4pPr>
-            <a:lvl5pPr marL="1828800" indent="0">
+            <a:lvl5pPr marL="1828823" indent="0">
               <a:buNone/>
               <a:defRPr sz="1000"/>
             </a:lvl5pPr>
-            <a:lvl6pPr marL="2286000" indent="0">
+            <a:lvl6pPr marL="2286029" indent="0">
               <a:buNone/>
               <a:defRPr sz="1000"/>
             </a:lvl6pPr>
-            <a:lvl7pPr marL="2743200" indent="0">
+            <a:lvl7pPr marL="2743234" indent="0">
               <a:buNone/>
               <a:defRPr sz="1000"/>
             </a:lvl7pPr>
-            <a:lvl8pPr marL="3200400" indent="0">
+            <a:lvl8pPr marL="3200440" indent="0">
               <a:buNone/>
               <a:defRPr sz="1000"/>
             </a:lvl8pPr>
-            <a:lvl9pPr marL="3657600" indent="0">
+            <a:lvl9pPr marL="3657646" indent="0">
               <a:buNone/>
               <a:defRPr sz="1000"/>
             </a:lvl9pPr>
@@ -2080,9 +2081,9 @@
           <a:p>
             <a:fld id="{F4618184-AC6B-4EC8-A593-7F91D186A496}" type="datetimeFigureOut">
               <a:rPr lang="de-DE" smtClean="0"/>
-              <a:t>21.04.2021</a:t>
+              <a:t>21.06.2023</a:t>
             </a:fld>
-            <a:endParaRPr lang="de-DE"/>
+            <a:endParaRPr lang="de-DE" dirty="0"/>
           </a:p>
         </p:txBody>
       </p:sp>
@@ -2101,7 +2102,7 @@
           <a:bodyPr/>
           <a:lstStyle/>
           <a:p>
-            <a:endParaRPr lang="de-DE"/>
+            <a:endParaRPr lang="de-DE" dirty="0"/>
           </a:p>
         </p:txBody>
       </p:sp>
@@ -2122,9 +2123,9 @@
           <a:p>
             <a:fld id="{A34684FD-1E56-4A97-950B-0E8E25D0F5ED}" type="slidenum">
               <a:rPr lang="de-DE" smtClean="0"/>
-              <a:t>‹Nr.›</a:t>
+              <a:t>‹#›</a:t>
             </a:fld>
-            <a:endParaRPr lang="de-DE"/>
+            <a:endParaRPr lang="de-DE" dirty="0"/>
           </a:p>
         </p:txBody>
       </p:sp>
@@ -2170,8 +2171,8 @@
         </p:nvSpPr>
         <p:spPr>
           <a:xfrm>
-            <a:off x="839788" y="457200"/>
-            <a:ext cx="3932237" cy="1600200"/>
+            <a:off x="839790" y="457200"/>
+            <a:ext cx="3932236" cy="1600200"/>
           </a:xfrm>
         </p:spPr>
         <p:txBody>
@@ -2202,7 +2203,7 @@
         <p:spPr>
           <a:xfrm>
             <a:off x="5183188" y="987425"/>
-            <a:ext cx="6172200" cy="4873625"/>
+            <a:ext cx="6172201" cy="4873625"/>
           </a:xfrm>
         </p:spPr>
         <p:txBody>
@@ -2212,41 +2213,41 @@
               <a:buNone/>
               <a:defRPr sz="3200"/>
             </a:lvl1pPr>
-            <a:lvl2pPr marL="457200" indent="0">
+            <a:lvl2pPr marL="457206" indent="0">
               <a:buNone/>
               <a:defRPr sz="2800"/>
             </a:lvl2pPr>
-            <a:lvl3pPr marL="914400" indent="0">
+            <a:lvl3pPr marL="914411" indent="0">
               <a:buNone/>
               <a:defRPr sz="2400"/>
             </a:lvl3pPr>
-            <a:lvl4pPr marL="1371600" indent="0">
+            <a:lvl4pPr marL="1371617" indent="0">
               <a:buNone/>
               <a:defRPr sz="2000"/>
             </a:lvl4pPr>
-            <a:lvl5pPr marL="1828800" indent="0">
+            <a:lvl5pPr marL="1828823" indent="0">
               <a:buNone/>
               <a:defRPr sz="2000"/>
             </a:lvl5pPr>
-            <a:lvl6pPr marL="2286000" indent="0">
+            <a:lvl6pPr marL="2286029" indent="0">
               <a:buNone/>
               <a:defRPr sz="2000"/>
             </a:lvl6pPr>
-            <a:lvl7pPr marL="2743200" indent="0">
+            <a:lvl7pPr marL="2743234" indent="0">
               <a:buNone/>
               <a:defRPr sz="2000"/>
             </a:lvl7pPr>
-            <a:lvl8pPr marL="3200400" indent="0">
+            <a:lvl8pPr marL="3200440" indent="0">
               <a:buNone/>
               <a:defRPr sz="2000"/>
             </a:lvl8pPr>
-            <a:lvl9pPr marL="3657600" indent="0">
+            <a:lvl9pPr marL="3657646" indent="0">
               <a:buNone/>
               <a:defRPr sz="2000"/>
             </a:lvl9pPr>
           </a:lstStyle>
           <a:p>
-            <a:endParaRPr lang="de-DE"/>
+            <a:endParaRPr lang="de-DE" dirty="0"/>
           </a:p>
         </p:txBody>
       </p:sp>
@@ -2262,8 +2263,8 @@
         </p:nvSpPr>
         <p:spPr>
           <a:xfrm>
-            <a:off x="839788" y="2057400"/>
-            <a:ext cx="3932237" cy="3811588"/>
+            <a:off x="839790" y="2057400"/>
+            <a:ext cx="3932236" cy="3811588"/>
           </a:xfrm>
         </p:spPr>
         <p:txBody>
@@ -2273,35 +2274,35 @@
               <a:buNone/>
               <a:defRPr sz="1600"/>
             </a:lvl1pPr>
-            <a:lvl2pPr marL="457200" indent="0">
+            <a:lvl2pPr marL="457206" indent="0">
               <a:buNone/>
               <a:defRPr sz="1400"/>
             </a:lvl2pPr>
-            <a:lvl3pPr marL="914400" indent="0">
+            <a:lvl3pPr marL="914411" indent="0">
               <a:buNone/>
               <a:defRPr sz="1200"/>
             </a:lvl3pPr>
-            <a:lvl4pPr marL="1371600" indent="0">
+            <a:lvl4pPr marL="1371617" indent="0">
               <a:buNone/>
               <a:defRPr sz="1000"/>
             </a:lvl4pPr>
-            <a:lvl5pPr marL="1828800" indent="0">
+            <a:lvl5pPr marL="1828823" indent="0">
               <a:buNone/>
               <a:defRPr sz="1000"/>
             </a:lvl5pPr>
-            <a:lvl6pPr marL="2286000" indent="0">
+            <a:lvl6pPr marL="2286029" indent="0">
               <a:buNone/>
               <a:defRPr sz="1000"/>
             </a:lvl6pPr>
-            <a:lvl7pPr marL="2743200" indent="0">
+            <a:lvl7pPr marL="2743234" indent="0">
               <a:buNone/>
               <a:defRPr sz="1000"/>
             </a:lvl7pPr>
-            <a:lvl8pPr marL="3200400" indent="0">
+            <a:lvl8pPr marL="3200440" indent="0">
               <a:buNone/>
               <a:defRPr sz="1000"/>
             </a:lvl8pPr>
-            <a:lvl9pPr marL="3657600" indent="0">
+            <a:lvl9pPr marL="3657646" indent="0">
               <a:buNone/>
               <a:defRPr sz="1000"/>
             </a:lvl9pPr>
@@ -2332,9 +2333,9 @@
           <a:p>
             <a:fld id="{F4618184-AC6B-4EC8-A593-7F91D186A496}" type="datetimeFigureOut">
               <a:rPr lang="de-DE" smtClean="0"/>
-              <a:t>21.04.2021</a:t>
+              <a:t>21.06.2023</a:t>
             </a:fld>
-            <a:endParaRPr lang="de-DE"/>
+            <a:endParaRPr lang="de-DE" dirty="0"/>
           </a:p>
         </p:txBody>
       </p:sp>
@@ -2353,7 +2354,7 @@
           <a:bodyPr/>
           <a:lstStyle/>
           <a:p>
-            <a:endParaRPr lang="de-DE"/>
+            <a:endParaRPr lang="de-DE" dirty="0"/>
           </a:p>
         </p:txBody>
       </p:sp>
@@ -2374,9 +2375,9 @@
           <a:p>
             <a:fld id="{A34684FD-1E56-4A97-950B-0E8E25D0F5ED}" type="slidenum">
               <a:rPr lang="de-DE" smtClean="0"/>
-              <a:t>‹Nr.›</a:t>
+              <a:t>‹#›</a:t>
             </a:fld>
-            <a:endParaRPr lang="de-DE"/>
+            <a:endParaRPr lang="de-DE" dirty="0"/>
           </a:p>
         </p:txBody>
       </p:sp>
@@ -2427,7 +2428,7 @@
         </p:nvSpPr>
         <p:spPr>
           <a:xfrm>
-            <a:off x="838200" y="365125"/>
+            <a:off x="838202" y="365125"/>
             <a:ext cx="10515600" cy="1325563"/>
           </a:xfrm>
           <a:prstGeom prst="rect">
@@ -2459,7 +2460,7 @@
         </p:nvSpPr>
         <p:spPr>
           <a:xfrm>
-            <a:off x="838200" y="1825625"/>
+            <a:off x="838202" y="1825625"/>
             <a:ext cx="10515600" cy="4351338"/>
           </a:xfrm>
           <a:prstGeom prst="rect">
@@ -2520,7 +2521,7 @@
         </p:nvSpPr>
         <p:spPr>
           <a:xfrm>
-            <a:off x="838200" y="6356350"/>
+            <a:off x="838201" y="6356351"/>
             <a:ext cx="2743200" cy="365125"/>
           </a:xfrm>
           <a:prstGeom prst="rect">
@@ -2543,9 +2544,9 @@
           <a:p>
             <a:fld id="{F4618184-AC6B-4EC8-A593-7F91D186A496}" type="datetimeFigureOut">
               <a:rPr lang="de-DE" smtClean="0"/>
-              <a:t>21.04.2021</a:t>
+              <a:t>21.06.2023</a:t>
             </a:fld>
-            <a:endParaRPr lang="de-DE"/>
+            <a:endParaRPr lang="de-DE" dirty="0"/>
           </a:p>
         </p:txBody>
       </p:sp>
@@ -2561,7 +2562,7 @@
         </p:nvSpPr>
         <p:spPr>
           <a:xfrm>
-            <a:off x="4038600" y="6356350"/>
+            <a:off x="4038602" y="6356351"/>
             <a:ext cx="4114800" cy="365125"/>
           </a:xfrm>
           <a:prstGeom prst="rect">
@@ -2582,7 +2583,7 @@
             </a:lvl1pPr>
           </a:lstStyle>
           <a:p>
-            <a:endParaRPr lang="de-DE"/>
+            <a:endParaRPr lang="de-DE" dirty="0"/>
           </a:p>
         </p:txBody>
       </p:sp>
@@ -2598,7 +2599,7 @@
         </p:nvSpPr>
         <p:spPr>
           <a:xfrm>
-            <a:off x="8610600" y="6356350"/>
+            <a:off x="8610601" y="6356351"/>
             <a:ext cx="2743200" cy="365125"/>
           </a:xfrm>
           <a:prstGeom prst="rect">
@@ -2621,9 +2622,9 @@
           <a:p>
             <a:fld id="{A34684FD-1E56-4A97-950B-0E8E25D0F5ED}" type="slidenum">
               <a:rPr lang="de-DE" smtClean="0"/>
-              <a:t>‹Nr.›</a:t>
+              <a:t>‹#›</a:t>
             </a:fld>
-            <a:endParaRPr lang="de-DE"/>
+            <a:endParaRPr lang="de-DE" dirty="0"/>
           </a:p>
         </p:txBody>
       </p:sp>
@@ -2650,7 +2651,7 @@
   </p:sldLayoutIdLst>
   <p:txStyles>
     <p:titleStyle>
-      <a:lvl1pPr algn="l" defTabSz="914400" rtl="0" eaLnBrk="1" latinLnBrk="0" hangingPunct="1">
+      <a:lvl1pPr algn="l" defTabSz="914411" rtl="0" eaLnBrk="1" latinLnBrk="0" hangingPunct="1">
         <a:lnSpc>
           <a:spcPct val="90000"/>
         </a:lnSpc>
@@ -2669,7 +2670,7 @@
       </a:lvl1pPr>
     </p:titleStyle>
     <p:bodyStyle>
-      <a:lvl1pPr marL="228600" indent="-228600" algn="l" defTabSz="914400" rtl="0" eaLnBrk="1" latinLnBrk="0" hangingPunct="1">
+      <a:lvl1pPr marL="228603" indent="-228603" algn="l" defTabSz="914411" rtl="0" eaLnBrk="1" latinLnBrk="0" hangingPunct="1">
         <a:lnSpc>
           <a:spcPct val="90000"/>
         </a:lnSpc>
@@ -2687,7 +2688,7 @@
           <a:cs typeface="+mn-cs"/>
         </a:defRPr>
       </a:lvl1pPr>
-      <a:lvl2pPr marL="685800" indent="-228600" algn="l" defTabSz="914400" rtl="0" eaLnBrk="1" latinLnBrk="0" hangingPunct="1">
+      <a:lvl2pPr marL="685808" indent="-228603" algn="l" defTabSz="914411" rtl="0" eaLnBrk="1" latinLnBrk="0" hangingPunct="1">
         <a:lnSpc>
           <a:spcPct val="90000"/>
         </a:lnSpc>
@@ -2705,7 +2706,7 @@
           <a:cs typeface="+mn-cs"/>
         </a:defRPr>
       </a:lvl2pPr>
-      <a:lvl3pPr marL="1143000" indent="-228600" algn="l" defTabSz="914400" rtl="0" eaLnBrk="1" latinLnBrk="0" hangingPunct="1">
+      <a:lvl3pPr marL="1143014" indent="-228603" algn="l" defTabSz="914411" rtl="0" eaLnBrk="1" latinLnBrk="0" hangingPunct="1">
         <a:lnSpc>
           <a:spcPct val="90000"/>
         </a:lnSpc>
@@ -2723,7 +2724,7 @@
           <a:cs typeface="+mn-cs"/>
         </a:defRPr>
       </a:lvl3pPr>
-      <a:lvl4pPr marL="1600200" indent="-228600" algn="l" defTabSz="914400" rtl="0" eaLnBrk="1" latinLnBrk="0" hangingPunct="1">
+      <a:lvl4pPr marL="1600220" indent="-228603" algn="l" defTabSz="914411" rtl="0" eaLnBrk="1" latinLnBrk="0" hangingPunct="1">
         <a:lnSpc>
           <a:spcPct val="90000"/>
         </a:lnSpc>
@@ -2741,7 +2742,7 @@
           <a:cs typeface="+mn-cs"/>
         </a:defRPr>
       </a:lvl4pPr>
-      <a:lvl5pPr marL="2057400" indent="-228600" algn="l" defTabSz="914400" rtl="0" eaLnBrk="1" latinLnBrk="0" hangingPunct="1">
+      <a:lvl5pPr marL="2057426" indent="-228603" algn="l" defTabSz="914411" rtl="0" eaLnBrk="1" latinLnBrk="0" hangingPunct="1">
         <a:lnSpc>
           <a:spcPct val="90000"/>
         </a:lnSpc>
@@ -2759,7 +2760,7 @@
           <a:cs typeface="+mn-cs"/>
         </a:defRPr>
       </a:lvl5pPr>
-      <a:lvl6pPr marL="2514600" indent="-228600" algn="l" defTabSz="914400" rtl="0" eaLnBrk="1" latinLnBrk="0" hangingPunct="1">
+      <a:lvl6pPr marL="2514632" indent="-228603" algn="l" defTabSz="914411" rtl="0" eaLnBrk="1" latinLnBrk="0" hangingPunct="1">
         <a:lnSpc>
           <a:spcPct val="90000"/>
         </a:lnSpc>
@@ -2777,7 +2778,7 @@
           <a:cs typeface="+mn-cs"/>
         </a:defRPr>
       </a:lvl6pPr>
-      <a:lvl7pPr marL="2971800" indent="-228600" algn="l" defTabSz="914400" rtl="0" eaLnBrk="1" latinLnBrk="0" hangingPunct="1">
+      <a:lvl7pPr marL="2971837" indent="-228603" algn="l" defTabSz="914411" rtl="0" eaLnBrk="1" latinLnBrk="0" hangingPunct="1">
         <a:lnSpc>
           <a:spcPct val="90000"/>
         </a:lnSpc>
@@ -2795,7 +2796,7 @@
           <a:cs typeface="+mn-cs"/>
         </a:defRPr>
       </a:lvl7pPr>
-      <a:lvl8pPr marL="3429000" indent="-228600" algn="l" defTabSz="914400" rtl="0" eaLnBrk="1" latinLnBrk="0" hangingPunct="1">
+      <a:lvl8pPr marL="3429043" indent="-228603" algn="l" defTabSz="914411" rtl="0" eaLnBrk="1" latinLnBrk="0" hangingPunct="1">
         <a:lnSpc>
           <a:spcPct val="90000"/>
         </a:lnSpc>
@@ -2813,7 +2814,7 @@
           <a:cs typeface="+mn-cs"/>
         </a:defRPr>
       </a:lvl8pPr>
-      <a:lvl9pPr marL="3886200" indent="-228600" algn="l" defTabSz="914400" rtl="0" eaLnBrk="1" latinLnBrk="0" hangingPunct="1">
+      <a:lvl9pPr marL="3886248" indent="-228603" algn="l" defTabSz="914411" rtl="0" eaLnBrk="1" latinLnBrk="0" hangingPunct="1">
         <a:lnSpc>
           <a:spcPct val="90000"/>
         </a:lnSpc>
@@ -2836,7 +2837,7 @@
       <a:defPPr>
         <a:defRPr lang="de-DE"/>
       </a:defPPr>
-      <a:lvl1pPr marL="0" algn="l" defTabSz="914400" rtl="0" eaLnBrk="1" latinLnBrk="0" hangingPunct="1">
+      <a:lvl1pPr marL="0" algn="l" defTabSz="914411" rtl="0" eaLnBrk="1" latinLnBrk="0" hangingPunct="1">
         <a:defRPr sz="1800" kern="1200">
           <a:solidFill>
             <a:schemeClr val="tx1"/>
@@ -2846,7 +2847,7 @@
           <a:cs typeface="+mn-cs"/>
         </a:defRPr>
       </a:lvl1pPr>
-      <a:lvl2pPr marL="457200" algn="l" defTabSz="914400" rtl="0" eaLnBrk="1" latinLnBrk="0" hangingPunct="1">
+      <a:lvl2pPr marL="457206" algn="l" defTabSz="914411" rtl="0" eaLnBrk="1" latinLnBrk="0" hangingPunct="1">
         <a:defRPr sz="1800" kern="1200">
           <a:solidFill>
             <a:schemeClr val="tx1"/>
@@ -2856,7 +2857,7 @@
           <a:cs typeface="+mn-cs"/>
         </a:defRPr>
       </a:lvl2pPr>
-      <a:lvl3pPr marL="914400" algn="l" defTabSz="914400" rtl="0" eaLnBrk="1" latinLnBrk="0" hangingPunct="1">
+      <a:lvl3pPr marL="914411" algn="l" defTabSz="914411" rtl="0" eaLnBrk="1" latinLnBrk="0" hangingPunct="1">
         <a:defRPr sz="1800" kern="1200">
           <a:solidFill>
             <a:schemeClr val="tx1"/>
@@ -2866,7 +2867,7 @@
           <a:cs typeface="+mn-cs"/>
         </a:defRPr>
       </a:lvl3pPr>
-      <a:lvl4pPr marL="1371600" algn="l" defTabSz="914400" rtl="0" eaLnBrk="1" latinLnBrk="0" hangingPunct="1">
+      <a:lvl4pPr marL="1371617" algn="l" defTabSz="914411" rtl="0" eaLnBrk="1" latinLnBrk="0" hangingPunct="1">
         <a:defRPr sz="1800" kern="1200">
           <a:solidFill>
             <a:schemeClr val="tx1"/>
@@ -2876,7 +2877,7 @@
           <a:cs typeface="+mn-cs"/>
         </a:defRPr>
       </a:lvl4pPr>
-      <a:lvl5pPr marL="1828800" algn="l" defTabSz="914400" rtl="0" eaLnBrk="1" latinLnBrk="0" hangingPunct="1">
+      <a:lvl5pPr marL="1828823" algn="l" defTabSz="914411" rtl="0" eaLnBrk="1" latinLnBrk="0" hangingPunct="1">
         <a:defRPr sz="1800" kern="1200">
           <a:solidFill>
             <a:schemeClr val="tx1"/>
@@ -2886,7 +2887,7 @@
           <a:cs typeface="+mn-cs"/>
         </a:defRPr>
       </a:lvl5pPr>
-      <a:lvl6pPr marL="2286000" algn="l" defTabSz="914400" rtl="0" eaLnBrk="1" latinLnBrk="0" hangingPunct="1">
+      <a:lvl6pPr marL="2286029" algn="l" defTabSz="914411" rtl="0" eaLnBrk="1" latinLnBrk="0" hangingPunct="1">
         <a:defRPr sz="1800" kern="1200">
           <a:solidFill>
             <a:schemeClr val="tx1"/>
@@ -2896,7 +2897,7 @@
           <a:cs typeface="+mn-cs"/>
         </a:defRPr>
       </a:lvl6pPr>
-      <a:lvl7pPr marL="2743200" algn="l" defTabSz="914400" rtl="0" eaLnBrk="1" latinLnBrk="0" hangingPunct="1">
+      <a:lvl7pPr marL="2743234" algn="l" defTabSz="914411" rtl="0" eaLnBrk="1" latinLnBrk="0" hangingPunct="1">
         <a:defRPr sz="1800" kern="1200">
           <a:solidFill>
             <a:schemeClr val="tx1"/>
@@ -2906,7 +2907,7 @@
           <a:cs typeface="+mn-cs"/>
         </a:defRPr>
       </a:lvl7pPr>
-      <a:lvl8pPr marL="3200400" algn="l" defTabSz="914400" rtl="0" eaLnBrk="1" latinLnBrk="0" hangingPunct="1">
+      <a:lvl8pPr marL="3200440" algn="l" defTabSz="914411" rtl="0" eaLnBrk="1" latinLnBrk="0" hangingPunct="1">
         <a:defRPr sz="1800" kern="1200">
           <a:solidFill>
             <a:schemeClr val="tx1"/>
@@ -2916,7 +2917,7 @@
           <a:cs typeface="+mn-cs"/>
         </a:defRPr>
       </a:lvl8pPr>
-      <a:lvl9pPr marL="3657600" algn="l" defTabSz="914400" rtl="0" eaLnBrk="1" latinLnBrk="0" hangingPunct="1">
+      <a:lvl9pPr marL="3657646" algn="l" defTabSz="914411" rtl="0" eaLnBrk="1" latinLnBrk="0" hangingPunct="1">
         <a:defRPr sz="1800" kern="1200">
           <a:solidFill>
             <a:schemeClr val="tx1"/>
@@ -2997,7 +2998,7 @@
           <a:p>
             <a:pPr algn="ctr"/>
             <a:r>
-              <a:rPr lang="de-DE" dirty="0" err="1">
+              <a:rPr lang="de-DE" dirty="0">
                 <a:solidFill>
                   <a:schemeClr val="tx1">
                     <a:lumMod val="50000"/>
@@ -3007,14 +3008,6 @@
               </a:rPr>
               <a:t>Presentation</a:t>
             </a:r>
-            <a:endParaRPr lang="de-DE" dirty="0">
-              <a:solidFill>
-                <a:schemeClr val="tx1">
-                  <a:lumMod val="50000"/>
-                  <a:lumOff val="50000"/>
-                </a:schemeClr>
-              </a:solidFill>
-            </a:endParaRPr>
           </a:p>
         </p:txBody>
       </p:sp>
@@ -3067,7 +3060,7 @@
           <a:p>
             <a:pPr algn="ctr"/>
             <a:r>
-              <a:rPr lang="de-DE" dirty="0" err="1">
+              <a:rPr lang="de-DE" dirty="0">
                 <a:solidFill>
                   <a:schemeClr val="tx1">
                     <a:lumMod val="50000"/>
@@ -3077,14 +3070,6 @@
               </a:rPr>
               <a:t>Application</a:t>
             </a:r>
-            <a:endParaRPr lang="de-DE" dirty="0">
-              <a:solidFill>
-                <a:schemeClr val="tx1">
-                  <a:lumMod val="50000"/>
-                  <a:lumOff val="50000"/>
-                </a:schemeClr>
-              </a:solidFill>
-            </a:endParaRPr>
           </a:p>
         </p:txBody>
       </p:sp>
@@ -3096,7 +3081,7 @@
         </p:nvSpPr>
         <p:spPr>
           <a:xfrm>
-            <a:off x="156518" y="5443246"/>
+            <a:off x="156519" y="5443246"/>
             <a:ext cx="11920151" cy="1263737"/>
           </a:xfrm>
           <a:prstGeom prst="rect">
@@ -3137,7 +3122,7 @@
           <a:p>
             <a:pPr algn="ctr"/>
             <a:r>
-              <a:rPr lang="de-DE" dirty="0" err="1">
+              <a:rPr lang="de-DE" dirty="0">
                 <a:solidFill>
                   <a:schemeClr val="tx1">
                     <a:lumMod val="50000"/>
@@ -3147,14 +3132,6 @@
               </a:rPr>
               <a:t>Persistence</a:t>
             </a:r>
-            <a:endParaRPr lang="de-DE" dirty="0">
-              <a:solidFill>
-                <a:schemeClr val="tx1">
-                  <a:lumMod val="50000"/>
-                  <a:lumOff val="50000"/>
-                </a:schemeClr>
-              </a:solidFill>
-            </a:endParaRPr>
           </a:p>
         </p:txBody>
       </p:sp>
@@ -3245,13 +3222,8 @@
             <a:pPr algn="ctr"/>
             <a:r>
               <a:rPr lang="de-DE" dirty="0"/>
-              <a:t>Filesystem / </a:t>
-            </a:r>
-            <a:r>
-              <a:rPr lang="de-DE" dirty="0" err="1"/>
-              <a:t>Flysystem</a:t>
-            </a:r>
-            <a:endParaRPr lang="de-DE" dirty="0"/>
+              <a:t>Filesystem / Flysystem</a:t>
+            </a:r>
           </a:p>
         </p:txBody>
       </p:sp>
@@ -3372,7 +3344,7 @@
         </p:nvSpPr>
         <p:spPr>
           <a:xfrm>
-            <a:off x="1438793" y="3833521"/>
+            <a:off x="1438793" y="3833522"/>
             <a:ext cx="9734032" cy="266700"/>
           </a:xfrm>
           <a:prstGeom prst="roundRect">
@@ -3402,15 +3374,7 @@
             <a:pPr algn="ctr"/>
             <a:r>
               <a:rPr lang="de-DE" sz="1400" dirty="0"/>
-              <a:t>Event </a:t>
-            </a:r>
-            <a:r>
-              <a:rPr lang="de-DE" sz="1400" dirty="0" err="1"/>
-              <a:t>Driven</a:t>
-            </a:r>
-            <a:r>
-              <a:rPr lang="de-DE" sz="1400" dirty="0"/>
-              <a:t> API</a:t>
+              <a:t>Event Driven API</a:t>
             </a:r>
           </a:p>
         </p:txBody>
@@ -3423,7 +3387,7 @@
         </p:nvSpPr>
         <p:spPr>
           <a:xfrm>
-            <a:off x="4174476" y="4520235"/>
+            <a:off x="4174476" y="4520236"/>
             <a:ext cx="1303200" cy="534865"/>
           </a:xfrm>
           <a:prstGeom prst="roundRect">
@@ -3538,10 +3502,9 @@
           <a:p>
             <a:pPr algn="ctr"/>
             <a:r>
-              <a:rPr lang="de-DE" dirty="0" err="1"/>
+              <a:rPr lang="de-DE" dirty="0"/>
               <a:t>Documents</a:t>
             </a:r>
-            <a:endParaRPr lang="de-DE" dirty="0"/>
           </a:p>
         </p:txBody>
       </p:sp>
@@ -3553,7 +3516,7 @@
         </p:nvSpPr>
         <p:spPr>
           <a:xfrm>
-            <a:off x="7025647" y="4188325"/>
+            <a:off x="7025647" y="4188326"/>
             <a:ext cx="1303200" cy="866775"/>
           </a:xfrm>
           <a:prstGeom prst="roundRect">
@@ -3582,10 +3545,9 @@
           <a:p>
             <a:pPr algn="ctr"/>
             <a:r>
-              <a:rPr lang="de-DE" dirty="0" err="1"/>
+              <a:rPr lang="de-DE" dirty="0"/>
               <a:t>Versioning</a:t>
             </a:r>
-            <a:endParaRPr lang="de-DE" dirty="0"/>
           </a:p>
         </p:txBody>
       </p:sp>
@@ -3669,10 +3631,9 @@
           <a:p>
             <a:pPr algn="ctr"/>
             <a:r>
-              <a:rPr lang="de-DE" dirty="0" err="1"/>
+              <a:rPr lang="de-DE" dirty="0"/>
               <a:t>Scheduling</a:t>
             </a:r>
-            <a:endParaRPr lang="de-DE" dirty="0"/>
           </a:p>
         </p:txBody>
       </p:sp>
@@ -3684,7 +3645,7 @@
         </p:nvSpPr>
         <p:spPr>
           <a:xfrm>
-            <a:off x="6550089" y="550506"/>
+            <a:off x="6550090" y="550507"/>
             <a:ext cx="5526579" cy="1390261"/>
           </a:xfrm>
           <a:prstGeom prst="rect">
@@ -3789,7 +3750,7 @@
         </p:nvCxnSpPr>
         <p:spPr>
           <a:xfrm flipV="1">
-            <a:off x="5848350" y="5138877"/>
+            <a:off x="5848351" y="5138877"/>
             <a:ext cx="12667" cy="491780"/>
           </a:xfrm>
           <a:prstGeom prst="straightConnector1">
@@ -4022,7 +3983,7 @@
         </p:nvSpPr>
         <p:spPr>
           <a:xfrm>
-            <a:off x="6382910" y="2255099"/>
+            <a:off x="6382911" y="2255099"/>
             <a:ext cx="4980415" cy="979714"/>
           </a:xfrm>
           <a:prstGeom prst="roundRect">
@@ -4157,7 +4118,7 @@
         </p:nvSpPr>
         <p:spPr>
           <a:xfrm>
-            <a:off x="6690298" y="737125"/>
+            <a:off x="6690298" y="737126"/>
             <a:ext cx="2043155" cy="1017021"/>
           </a:xfrm>
           <a:prstGeom prst="roundRect">
@@ -4187,13 +4148,8 @@
             <a:pPr algn="ctr"/>
             <a:r>
               <a:rPr lang="de-DE" dirty="0"/>
-              <a:t>CLI </a:t>
-            </a:r>
-            <a:r>
-              <a:rPr lang="de-DE" dirty="0" err="1"/>
-              <a:t>Commands</a:t>
-            </a:r>
-            <a:endParaRPr lang="de-DE" dirty="0"/>
+              <a:t>CLI Commands</a:t>
+            </a:r>
           </a:p>
         </p:txBody>
       </p:sp>
@@ -4287,7 +4243,7 @@
         </p:nvCxnSpPr>
         <p:spPr>
           <a:xfrm flipV="1">
-            <a:off x="4467039" y="1318361"/>
+            <a:off x="4467040" y="1318362"/>
             <a:ext cx="6333" cy="310167"/>
           </a:xfrm>
           <a:prstGeom prst="straightConnector1">
@@ -4406,7 +4362,7 @@
         </p:nvCxnSpPr>
         <p:spPr>
           <a:xfrm flipV="1">
-            <a:off x="7697682" y="1760509"/>
+            <a:off x="7697683" y="1760510"/>
             <a:ext cx="14193" cy="367669"/>
           </a:xfrm>
           <a:prstGeom prst="straightConnector1">
@@ -4595,7 +4551,7 @@
           <a:p>
             <a:pPr algn="ctr"/>
             <a:r>
-              <a:rPr lang="de-DE" dirty="0" err="1">
+              <a:rPr lang="de-DE" dirty="0">
                 <a:solidFill>
                   <a:schemeClr val="bg1"/>
                 </a:solidFill>
@@ -4634,7 +4590,7 @@
         </p:nvSpPr>
         <p:spPr>
           <a:xfrm>
-            <a:off x="5603763" y="4188325"/>
+            <a:off x="5603763" y="4188326"/>
             <a:ext cx="1303200" cy="866775"/>
           </a:xfrm>
           <a:prstGeom prst="roundRect">
@@ -4673,6 +4629,1742 @@
     <p:extLst>
       <p:ext uri="{BB962C8B-B14F-4D97-AF65-F5344CB8AC3E}">
         <p14:creationId xmlns:p14="http://schemas.microsoft.com/office/powerpoint/2010/main" val="1980191405"/>
+      </p:ext>
+    </p:extLst>
+  </p:cSld>
+  <p:clrMapOvr>
+    <a:masterClrMapping/>
+  </p:clrMapOvr>
+</p:sld>
+</file>
+
+<file path=ppt/slides/slide2.xml><?xml version="1.0" encoding="utf-8"?>
+<p:sld xmlns:a="http://schemas.openxmlformats.org/drawingml/2006/main" xmlns:r="http://schemas.openxmlformats.org/officeDocument/2006/relationships" xmlns:p="http://schemas.openxmlformats.org/presentationml/2006/main">
+  <p:cSld>
+    <p:spTree>
+      <p:nvGrpSpPr>
+        <p:cNvPr id="1" name=""/>
+        <p:cNvGrpSpPr/>
+        <p:nvPr/>
+      </p:nvGrpSpPr>
+      <p:grpSpPr>
+        <a:xfrm>
+          <a:off x="0" y="0"/>
+          <a:ext cx="0" cy="0"/>
+          <a:chOff x="0" y="0"/>
+          <a:chExt cx="0" cy="0"/>
+        </a:xfrm>
+      </p:grpSpPr>
+      <p:sp>
+        <p:nvSpPr>
+          <p:cNvPr id="4" name="Rechteck 3"/>
+          <p:cNvSpPr/>
+          <p:nvPr/>
+        </p:nvSpPr>
+        <p:spPr>
+          <a:xfrm>
+            <a:off x="156520" y="336588"/>
+            <a:ext cx="11920150" cy="1392127"/>
+          </a:xfrm>
+          <a:prstGeom prst="rect">
+            <a:avLst/>
+          </a:prstGeom>
+          <a:solidFill>
+            <a:schemeClr val="bg1"/>
+          </a:solidFill>
+          <a:ln>
+            <a:solidFill>
+              <a:schemeClr val="tx1">
+                <a:lumMod val="50000"/>
+                <a:lumOff val="50000"/>
+              </a:schemeClr>
+            </a:solidFill>
+            <a:prstDash val="dashDot"/>
+          </a:ln>
+        </p:spPr>
+        <p:style>
+          <a:lnRef idx="2">
+            <a:schemeClr val="accent1">
+              <a:shade val="50000"/>
+            </a:schemeClr>
+          </a:lnRef>
+          <a:fillRef idx="1">
+            <a:schemeClr val="accent1"/>
+          </a:fillRef>
+          <a:effectRef idx="0">
+            <a:schemeClr val="accent1"/>
+          </a:effectRef>
+          <a:fontRef idx="minor">
+            <a:schemeClr val="lt1"/>
+          </a:fontRef>
+        </p:style>
+        <p:txBody>
+          <a:bodyPr vert="vert270" rtlCol="0" anchor="b" anchorCtr="1"/>
+          <a:lstStyle/>
+          <a:p>
+            <a:pPr algn="ctr"/>
+            <a:r>
+              <a:rPr lang="de-DE" dirty="0">
+                <a:solidFill>
+                  <a:schemeClr val="tx1">
+                    <a:lumMod val="50000"/>
+                    <a:lumOff val="50000"/>
+                  </a:schemeClr>
+                </a:solidFill>
+              </a:rPr>
+              <a:t>Presentation &amp; Interfaces</a:t>
+            </a:r>
+          </a:p>
+        </p:txBody>
+      </p:sp>
+      <p:sp>
+        <p:nvSpPr>
+          <p:cNvPr id="8" name="Rechteck 7"/>
+          <p:cNvSpPr/>
+          <p:nvPr/>
+        </p:nvSpPr>
+        <p:spPr>
+          <a:xfrm>
+            <a:off x="156519" y="1916126"/>
+            <a:ext cx="11920151" cy="3346862"/>
+          </a:xfrm>
+          <a:prstGeom prst="rect">
+            <a:avLst/>
+          </a:prstGeom>
+          <a:solidFill>
+            <a:schemeClr val="bg1"/>
+          </a:solidFill>
+          <a:ln>
+            <a:solidFill>
+              <a:schemeClr val="tx1">
+                <a:lumMod val="50000"/>
+                <a:lumOff val="50000"/>
+              </a:schemeClr>
+            </a:solidFill>
+            <a:prstDash val="dashDot"/>
+          </a:ln>
+        </p:spPr>
+        <p:style>
+          <a:lnRef idx="2">
+            <a:schemeClr val="accent1">
+              <a:shade val="50000"/>
+            </a:schemeClr>
+          </a:lnRef>
+          <a:fillRef idx="1">
+            <a:schemeClr val="accent1"/>
+          </a:fillRef>
+          <a:effectRef idx="0">
+            <a:schemeClr val="accent1"/>
+          </a:effectRef>
+          <a:fontRef idx="minor">
+            <a:schemeClr val="lt1"/>
+          </a:fontRef>
+        </p:style>
+        <p:txBody>
+          <a:bodyPr vert="vert270" rtlCol="0" anchor="b" anchorCtr="1"/>
+          <a:lstStyle/>
+          <a:p>
+            <a:pPr algn="ctr"/>
+            <a:r>
+              <a:rPr lang="de-DE" dirty="0">
+                <a:solidFill>
+                  <a:schemeClr val="tx1">
+                    <a:lumMod val="50000"/>
+                    <a:lumOff val="50000"/>
+                  </a:schemeClr>
+                </a:solidFill>
+              </a:rPr>
+              <a:t>Application</a:t>
+            </a:r>
+          </a:p>
+        </p:txBody>
+      </p:sp>
+      <p:sp>
+        <p:nvSpPr>
+          <p:cNvPr id="9" name="Rechteck 8"/>
+          <p:cNvSpPr/>
+          <p:nvPr/>
+        </p:nvSpPr>
+        <p:spPr>
+          <a:xfrm>
+            <a:off x="156519" y="5443246"/>
+            <a:ext cx="11920151" cy="1263737"/>
+          </a:xfrm>
+          <a:prstGeom prst="rect">
+            <a:avLst/>
+          </a:prstGeom>
+          <a:solidFill>
+            <a:schemeClr val="bg1"/>
+          </a:solidFill>
+          <a:ln>
+            <a:solidFill>
+              <a:schemeClr val="tx1">
+                <a:lumMod val="50000"/>
+                <a:lumOff val="50000"/>
+              </a:schemeClr>
+            </a:solidFill>
+            <a:prstDash val="dashDot"/>
+          </a:ln>
+        </p:spPr>
+        <p:style>
+          <a:lnRef idx="2">
+            <a:schemeClr val="accent1">
+              <a:shade val="50000"/>
+            </a:schemeClr>
+          </a:lnRef>
+          <a:fillRef idx="1">
+            <a:schemeClr val="accent1"/>
+          </a:fillRef>
+          <a:effectRef idx="0">
+            <a:schemeClr val="accent1"/>
+          </a:effectRef>
+          <a:fontRef idx="minor">
+            <a:schemeClr val="lt1"/>
+          </a:fontRef>
+        </p:style>
+        <p:txBody>
+          <a:bodyPr vert="vert270" rtlCol="0" anchor="b" anchorCtr="1"/>
+          <a:lstStyle/>
+          <a:p>
+            <a:pPr algn="ctr"/>
+            <a:r>
+              <a:rPr lang="de-DE" dirty="0">
+                <a:solidFill>
+                  <a:schemeClr val="tx1">
+                    <a:lumMod val="50000"/>
+                    <a:lumOff val="50000"/>
+                  </a:schemeClr>
+                </a:solidFill>
+              </a:rPr>
+              <a:t>Persistence</a:t>
+            </a:r>
+          </a:p>
+        </p:txBody>
+      </p:sp>
+      <p:sp>
+        <p:nvSpPr>
+          <p:cNvPr id="10" name="Abgerundetes Rechteck 9"/>
+          <p:cNvSpPr/>
+          <p:nvPr/>
+        </p:nvSpPr>
+        <p:spPr>
+          <a:xfrm>
+            <a:off x="333376" y="5628198"/>
+            <a:ext cx="2595111" cy="876300"/>
+          </a:xfrm>
+          <a:prstGeom prst="roundRect">
+            <a:avLst/>
+          </a:prstGeom>
+          <a:solidFill>
+            <a:schemeClr val="accent6"/>
+          </a:solidFill>
+        </p:spPr>
+        <p:style>
+          <a:lnRef idx="2">
+            <a:schemeClr val="accent1">
+              <a:shade val="50000"/>
+            </a:schemeClr>
+          </a:lnRef>
+          <a:fillRef idx="1">
+            <a:schemeClr val="accent1"/>
+          </a:fillRef>
+          <a:effectRef idx="0">
+            <a:schemeClr val="accent1"/>
+          </a:effectRef>
+          <a:fontRef idx="minor">
+            <a:schemeClr val="lt1"/>
+          </a:fontRef>
+        </p:style>
+        <p:txBody>
+          <a:bodyPr rtlCol="0" anchor="ctr"/>
+          <a:lstStyle/>
+          <a:p>
+            <a:pPr algn="ctr"/>
+            <a:r>
+              <a:rPr lang="de-DE" dirty="0"/>
+              <a:t>Database</a:t>
+            </a:r>
+          </a:p>
+        </p:txBody>
+      </p:sp>
+      <p:sp>
+        <p:nvSpPr>
+          <p:cNvPr id="11" name="Abgerundetes Rechteck 10"/>
+          <p:cNvSpPr/>
+          <p:nvPr/>
+        </p:nvSpPr>
+        <p:spPr>
+          <a:xfrm>
+            <a:off x="3160798" y="5628198"/>
+            <a:ext cx="2595111" cy="876300"/>
+          </a:xfrm>
+          <a:prstGeom prst="roundRect">
+            <a:avLst/>
+          </a:prstGeom>
+          <a:solidFill>
+            <a:schemeClr val="accent6"/>
+          </a:solidFill>
+        </p:spPr>
+        <p:style>
+          <a:lnRef idx="2">
+            <a:schemeClr val="accent1">
+              <a:shade val="50000"/>
+            </a:schemeClr>
+          </a:lnRef>
+          <a:fillRef idx="1">
+            <a:schemeClr val="accent1"/>
+          </a:fillRef>
+          <a:effectRef idx="0">
+            <a:schemeClr val="accent1"/>
+          </a:effectRef>
+          <a:fontRef idx="minor">
+            <a:schemeClr val="lt1"/>
+          </a:fontRef>
+        </p:style>
+        <p:txBody>
+          <a:bodyPr rtlCol="0" anchor="ctr"/>
+          <a:lstStyle/>
+          <a:p>
+            <a:pPr algn="ctr"/>
+            <a:r>
+              <a:rPr lang="de-DE" dirty="0"/>
+              <a:t>Filesystem / Flysystem</a:t>
+            </a:r>
+          </a:p>
+        </p:txBody>
+      </p:sp>
+      <p:sp>
+        <p:nvSpPr>
+          <p:cNvPr id="12" name="Abgerundetes Rechteck 11"/>
+          <p:cNvSpPr/>
+          <p:nvPr/>
+        </p:nvSpPr>
+        <p:spPr>
+          <a:xfrm>
+            <a:off x="5988220" y="5628198"/>
+            <a:ext cx="2569340" cy="876300"/>
+          </a:xfrm>
+          <a:prstGeom prst="roundRect">
+            <a:avLst/>
+          </a:prstGeom>
+          <a:solidFill>
+            <a:schemeClr val="accent6"/>
+          </a:solidFill>
+        </p:spPr>
+        <p:style>
+          <a:lnRef idx="2">
+            <a:schemeClr val="accent1">
+              <a:shade val="50000"/>
+            </a:schemeClr>
+          </a:lnRef>
+          <a:fillRef idx="1">
+            <a:schemeClr val="accent1"/>
+          </a:fillRef>
+          <a:effectRef idx="0">
+            <a:schemeClr val="accent1"/>
+          </a:effectRef>
+          <a:fontRef idx="minor">
+            <a:schemeClr val="lt1"/>
+          </a:fontRef>
+        </p:style>
+        <p:txBody>
+          <a:bodyPr rtlCol="0" anchor="ctr"/>
+          <a:lstStyle/>
+          <a:p>
+            <a:pPr algn="ctr"/>
+            <a:r>
+              <a:rPr lang="de-DE" dirty="0"/>
+              <a:t>Cache-System</a:t>
+            </a:r>
+          </a:p>
+        </p:txBody>
+      </p:sp>
+      <p:sp>
+        <p:nvSpPr>
+          <p:cNvPr id="13" name="Abgerundetes Rechteck 12"/>
+          <p:cNvSpPr/>
+          <p:nvPr/>
+        </p:nvSpPr>
+        <p:spPr>
+          <a:xfrm>
+            <a:off x="333376" y="3665288"/>
+            <a:ext cx="11029950" cy="1473157"/>
+          </a:xfrm>
+          <a:prstGeom prst="roundRect">
+            <a:avLst/>
+          </a:prstGeom>
+          <a:solidFill>
+            <a:schemeClr val="accent1">
+              <a:lumMod val="20000"/>
+              <a:lumOff val="80000"/>
+            </a:schemeClr>
+          </a:solidFill>
+          <a:ln w="9525" cap="flat" cmpd="sng" algn="ctr">
+            <a:solidFill>
+              <a:schemeClr val="accent5"/>
+            </a:solidFill>
+            <a:prstDash val="solid"/>
+            <a:round/>
+            <a:headEnd type="none" w="med" len="med"/>
+            <a:tailEnd type="none" w="med" len="med"/>
+          </a:ln>
+        </p:spPr>
+        <p:style>
+          <a:lnRef idx="0">
+            <a:scrgbClr r="0" g="0" b="0"/>
+          </a:lnRef>
+          <a:fillRef idx="0">
+            <a:scrgbClr r="0" g="0" b="0"/>
+          </a:fillRef>
+          <a:effectRef idx="0">
+            <a:scrgbClr r="0" g="0" b="0"/>
+          </a:effectRef>
+          <a:fontRef idx="minor">
+            <a:schemeClr val="accent5"/>
+          </a:fontRef>
+        </p:style>
+        <p:txBody>
+          <a:bodyPr vert="vert270" rtlCol="0" anchor="t" anchorCtr="1"/>
+          <a:lstStyle/>
+          <a:p>
+            <a:pPr algn="ctr"/>
+            <a:r>
+              <a:rPr lang="de-DE" dirty="0"/>
+              <a:t>Pimcore</a:t>
+            </a:r>
+          </a:p>
+          <a:p>
+            <a:pPr algn="ctr"/>
+            <a:r>
+              <a:rPr lang="de-DE" dirty="0"/>
+              <a:t>Core</a:t>
+            </a:r>
+          </a:p>
+        </p:txBody>
+      </p:sp>
+      <p:sp>
+        <p:nvSpPr>
+          <p:cNvPr id="14" name="Abgerundetes Rechteck 13"/>
+          <p:cNvSpPr/>
+          <p:nvPr/>
+        </p:nvSpPr>
+        <p:spPr>
+          <a:xfrm>
+            <a:off x="1438793" y="3833522"/>
+            <a:ext cx="9734032" cy="266700"/>
+          </a:xfrm>
+          <a:prstGeom prst="roundRect">
+            <a:avLst/>
+          </a:prstGeom>
+        </p:spPr>
+        <p:style>
+          <a:lnRef idx="2">
+            <a:schemeClr val="accent1">
+              <a:shade val="50000"/>
+            </a:schemeClr>
+          </a:lnRef>
+          <a:fillRef idx="1">
+            <a:schemeClr val="accent1"/>
+          </a:fillRef>
+          <a:effectRef idx="0">
+            <a:schemeClr val="accent1"/>
+          </a:effectRef>
+          <a:fontRef idx="minor">
+            <a:schemeClr val="lt1"/>
+          </a:fontRef>
+        </p:style>
+        <p:txBody>
+          <a:bodyPr rtlCol="0" anchor="ctr"/>
+          <a:lstStyle/>
+          <a:p>
+            <a:pPr algn="ctr"/>
+            <a:r>
+              <a:rPr lang="de-DE" sz="1400"/>
+              <a:t>Event Driven PHP </a:t>
+            </a:r>
+            <a:r>
+              <a:rPr lang="de-DE" sz="1400" dirty="0"/>
+              <a:t>API</a:t>
+            </a:r>
+          </a:p>
+        </p:txBody>
+      </p:sp>
+      <p:sp>
+        <p:nvSpPr>
+          <p:cNvPr id="15" name="Abgerundetes Rechteck 14"/>
+          <p:cNvSpPr/>
+          <p:nvPr/>
+        </p:nvSpPr>
+        <p:spPr>
+          <a:xfrm>
+            <a:off x="4174476" y="4520236"/>
+            <a:ext cx="1303200" cy="534865"/>
+          </a:xfrm>
+          <a:prstGeom prst="roundRect">
+            <a:avLst/>
+          </a:prstGeom>
+        </p:spPr>
+        <p:style>
+          <a:lnRef idx="2">
+            <a:schemeClr val="accent1">
+              <a:shade val="50000"/>
+            </a:schemeClr>
+          </a:lnRef>
+          <a:fillRef idx="1">
+            <a:schemeClr val="accent1"/>
+          </a:fillRef>
+          <a:effectRef idx="0">
+            <a:schemeClr val="accent1"/>
+          </a:effectRef>
+          <a:fontRef idx="minor">
+            <a:schemeClr val="lt1"/>
+          </a:fontRef>
+        </p:style>
+        <p:txBody>
+          <a:bodyPr rtlCol="0" anchor="ctr"/>
+          <a:lstStyle/>
+          <a:p>
+            <a:pPr algn="ctr"/>
+            <a:r>
+              <a:rPr lang="de-DE" dirty="0"/>
+              <a:t>Assets</a:t>
+            </a:r>
+          </a:p>
+        </p:txBody>
+      </p:sp>
+      <p:sp>
+        <p:nvSpPr>
+          <p:cNvPr id="16" name="Abgerundetes Rechteck 15"/>
+          <p:cNvSpPr/>
+          <p:nvPr/>
+        </p:nvSpPr>
+        <p:spPr>
+          <a:xfrm>
+            <a:off x="2807238" y="4520235"/>
+            <a:ext cx="1303200" cy="534865"/>
+          </a:xfrm>
+          <a:prstGeom prst="roundRect">
+            <a:avLst/>
+          </a:prstGeom>
+        </p:spPr>
+        <p:style>
+          <a:lnRef idx="2">
+            <a:schemeClr val="accent1">
+              <a:shade val="50000"/>
+            </a:schemeClr>
+          </a:lnRef>
+          <a:fillRef idx="1">
+            <a:schemeClr val="accent1"/>
+          </a:fillRef>
+          <a:effectRef idx="0">
+            <a:schemeClr val="accent1"/>
+          </a:effectRef>
+          <a:fontRef idx="minor">
+            <a:schemeClr val="lt1"/>
+          </a:fontRef>
+        </p:style>
+        <p:txBody>
+          <a:bodyPr rtlCol="0" anchor="ctr"/>
+          <a:lstStyle/>
+          <a:p>
+            <a:pPr algn="ctr"/>
+            <a:r>
+              <a:rPr lang="de-DE" dirty="0"/>
+              <a:t>Objects</a:t>
+            </a:r>
+          </a:p>
+        </p:txBody>
+      </p:sp>
+      <p:sp>
+        <p:nvSpPr>
+          <p:cNvPr id="17" name="Abgerundetes Rechteck 16"/>
+          <p:cNvSpPr/>
+          <p:nvPr/>
+        </p:nvSpPr>
+        <p:spPr>
+          <a:xfrm>
+            <a:off x="1438793" y="4520235"/>
+            <a:ext cx="1304407" cy="534865"/>
+          </a:xfrm>
+          <a:prstGeom prst="roundRect">
+            <a:avLst/>
+          </a:prstGeom>
+        </p:spPr>
+        <p:style>
+          <a:lnRef idx="2">
+            <a:schemeClr val="accent1">
+              <a:shade val="50000"/>
+            </a:schemeClr>
+          </a:lnRef>
+          <a:fillRef idx="1">
+            <a:schemeClr val="accent1"/>
+          </a:fillRef>
+          <a:effectRef idx="0">
+            <a:schemeClr val="accent1"/>
+          </a:effectRef>
+          <a:fontRef idx="minor">
+            <a:schemeClr val="lt1"/>
+          </a:fontRef>
+        </p:style>
+        <p:txBody>
+          <a:bodyPr rtlCol="0" anchor="ctr"/>
+          <a:lstStyle/>
+          <a:p>
+            <a:pPr algn="ctr"/>
+            <a:r>
+              <a:rPr lang="de-DE" dirty="0"/>
+              <a:t>Documents</a:t>
+            </a:r>
+          </a:p>
+        </p:txBody>
+      </p:sp>
+      <p:sp>
+        <p:nvSpPr>
+          <p:cNvPr id="18" name="Abgerundetes Rechteck 17"/>
+          <p:cNvSpPr/>
+          <p:nvPr/>
+        </p:nvSpPr>
+        <p:spPr>
+          <a:xfrm>
+            <a:off x="5708792" y="4188325"/>
+            <a:ext cx="1614521" cy="866775"/>
+          </a:xfrm>
+          <a:prstGeom prst="roundRect">
+            <a:avLst/>
+          </a:prstGeom>
+        </p:spPr>
+        <p:style>
+          <a:lnRef idx="2">
+            <a:schemeClr val="accent1">
+              <a:shade val="50000"/>
+            </a:schemeClr>
+          </a:lnRef>
+          <a:fillRef idx="1">
+            <a:schemeClr val="accent1"/>
+          </a:fillRef>
+          <a:effectRef idx="0">
+            <a:schemeClr val="accent1"/>
+          </a:effectRef>
+          <a:fontRef idx="minor">
+            <a:schemeClr val="lt1"/>
+          </a:fontRef>
+        </p:style>
+        <p:txBody>
+          <a:bodyPr rtlCol="0" anchor="ctr"/>
+          <a:lstStyle/>
+          <a:p>
+            <a:pPr algn="ctr"/>
+            <a:r>
+              <a:rPr lang="de-DE" dirty="0"/>
+              <a:t>Versioning</a:t>
+            </a:r>
+          </a:p>
+        </p:txBody>
+      </p:sp>
+      <p:sp>
+        <p:nvSpPr>
+          <p:cNvPr id="19" name="Abgerundetes Rechteck 18"/>
+          <p:cNvSpPr/>
+          <p:nvPr/>
+        </p:nvSpPr>
+        <p:spPr>
+          <a:xfrm>
+            <a:off x="7636007" y="4195409"/>
+            <a:ext cx="1614521" cy="866775"/>
+          </a:xfrm>
+          <a:prstGeom prst="roundRect">
+            <a:avLst/>
+          </a:prstGeom>
+        </p:spPr>
+        <p:style>
+          <a:lnRef idx="2">
+            <a:schemeClr val="accent1">
+              <a:shade val="50000"/>
+            </a:schemeClr>
+          </a:lnRef>
+          <a:fillRef idx="1">
+            <a:schemeClr val="accent1"/>
+          </a:fillRef>
+          <a:effectRef idx="0">
+            <a:schemeClr val="accent1"/>
+          </a:effectRef>
+          <a:fontRef idx="minor">
+            <a:schemeClr val="lt1"/>
+          </a:fontRef>
+        </p:style>
+        <p:txBody>
+          <a:bodyPr rtlCol="0" anchor="ctr"/>
+          <a:lstStyle/>
+          <a:p>
+            <a:pPr algn="ctr"/>
+            <a:r>
+              <a:rPr lang="de-DE" dirty="0"/>
+              <a:t>Workflows</a:t>
+            </a:r>
+          </a:p>
+        </p:txBody>
+      </p:sp>
+      <p:sp>
+        <p:nvSpPr>
+          <p:cNvPr id="20" name="Abgerundetes Rechteck 19"/>
+          <p:cNvSpPr/>
+          <p:nvPr/>
+        </p:nvSpPr>
+        <p:spPr>
+          <a:xfrm>
+            <a:off x="9558093" y="4188325"/>
+            <a:ext cx="1614521" cy="866775"/>
+          </a:xfrm>
+          <a:prstGeom prst="roundRect">
+            <a:avLst/>
+          </a:prstGeom>
+        </p:spPr>
+        <p:style>
+          <a:lnRef idx="2">
+            <a:schemeClr val="accent1">
+              <a:shade val="50000"/>
+            </a:schemeClr>
+          </a:lnRef>
+          <a:fillRef idx="1">
+            <a:schemeClr val="accent1"/>
+          </a:fillRef>
+          <a:effectRef idx="0">
+            <a:schemeClr val="accent1"/>
+          </a:effectRef>
+          <a:fontRef idx="minor">
+            <a:schemeClr val="lt1"/>
+          </a:fontRef>
+        </p:style>
+        <p:txBody>
+          <a:bodyPr rtlCol="0" anchor="ctr"/>
+          <a:lstStyle/>
+          <a:p>
+            <a:pPr algn="ctr"/>
+            <a:r>
+              <a:rPr lang="de-DE" dirty="0"/>
+              <a:t>Scheduling</a:t>
+            </a:r>
+          </a:p>
+        </p:txBody>
+      </p:sp>
+      <p:sp>
+        <p:nvSpPr>
+          <p:cNvPr id="7" name="Abgerundetes Rechteck 6"/>
+          <p:cNvSpPr/>
+          <p:nvPr/>
+        </p:nvSpPr>
+        <p:spPr>
+          <a:xfrm>
+            <a:off x="290330" y="1212167"/>
+            <a:ext cx="11058932" cy="810092"/>
+          </a:xfrm>
+          <a:prstGeom prst="roundRect">
+            <a:avLst/>
+          </a:prstGeom>
+          <a:solidFill>
+            <a:schemeClr val="accent1">
+              <a:lumMod val="20000"/>
+              <a:lumOff val="80000"/>
+            </a:schemeClr>
+          </a:solidFill>
+        </p:spPr>
+        <p:style>
+          <a:lnRef idx="2">
+            <a:schemeClr val="accent1">
+              <a:shade val="50000"/>
+            </a:schemeClr>
+          </a:lnRef>
+          <a:fillRef idx="1">
+            <a:schemeClr val="accent1"/>
+          </a:fillRef>
+          <a:effectRef idx="0">
+            <a:schemeClr val="accent1"/>
+          </a:effectRef>
+          <a:fontRef idx="minor">
+            <a:schemeClr val="lt1"/>
+          </a:fontRef>
+        </p:style>
+        <p:txBody>
+          <a:bodyPr vert="vert270" rtlCol="0" anchor="t" anchorCtr="0"/>
+          <a:lstStyle/>
+          <a:p>
+            <a:pPr algn="ctr"/>
+            <a:r>
+              <a:rPr lang="de-DE" dirty="0">
+                <a:solidFill>
+                  <a:schemeClr val="accent5"/>
+                </a:solidFill>
+              </a:rPr>
+              <a:t>MVC &amp; APIs</a:t>
+            </a:r>
+          </a:p>
+        </p:txBody>
+      </p:sp>
+      <p:sp>
+        <p:nvSpPr>
+          <p:cNvPr id="29" name="Abgerundetes Rechteck 28"/>
+          <p:cNvSpPr/>
+          <p:nvPr/>
+        </p:nvSpPr>
+        <p:spPr>
+          <a:xfrm>
+            <a:off x="290330" y="503801"/>
+            <a:ext cx="2595110" cy="575068"/>
+          </a:xfrm>
+          <a:prstGeom prst="roundRect">
+            <a:avLst/>
+          </a:prstGeom>
+        </p:spPr>
+        <p:style>
+          <a:lnRef idx="2">
+            <a:schemeClr val="accent3">
+              <a:shade val="50000"/>
+            </a:schemeClr>
+          </a:lnRef>
+          <a:fillRef idx="1">
+            <a:schemeClr val="accent3"/>
+          </a:fillRef>
+          <a:effectRef idx="0">
+            <a:schemeClr val="accent3"/>
+          </a:effectRef>
+          <a:fontRef idx="minor">
+            <a:schemeClr val="lt1"/>
+          </a:fontRef>
+        </p:style>
+        <p:txBody>
+          <a:bodyPr rtlCol="0" anchor="ctr"/>
+          <a:lstStyle/>
+          <a:p>
+            <a:pPr algn="ctr"/>
+            <a:r>
+              <a:rPr lang="de-DE" dirty="0"/>
+              <a:t>Browser</a:t>
+            </a:r>
+          </a:p>
+        </p:txBody>
+      </p:sp>
+      <p:sp>
+        <p:nvSpPr>
+          <p:cNvPr id="30" name="Abgerundetes Rechteck 29"/>
+          <p:cNvSpPr/>
+          <p:nvPr/>
+        </p:nvSpPr>
+        <p:spPr>
+          <a:xfrm>
+            <a:off x="3131467" y="504523"/>
+            <a:ext cx="2584444" cy="583101"/>
+          </a:xfrm>
+          <a:prstGeom prst="roundRect">
+            <a:avLst/>
+          </a:prstGeom>
+        </p:spPr>
+        <p:style>
+          <a:lnRef idx="2">
+            <a:schemeClr val="accent3">
+              <a:shade val="50000"/>
+            </a:schemeClr>
+          </a:lnRef>
+          <a:fillRef idx="1">
+            <a:schemeClr val="accent3"/>
+          </a:fillRef>
+          <a:effectRef idx="0">
+            <a:schemeClr val="accent3"/>
+          </a:effectRef>
+          <a:fontRef idx="minor">
+            <a:schemeClr val="lt1"/>
+          </a:fontRef>
+        </p:style>
+        <p:txBody>
+          <a:bodyPr rtlCol="0" anchor="ctr"/>
+          <a:lstStyle/>
+          <a:p>
+            <a:pPr algn="ctr"/>
+            <a:r>
+              <a:rPr lang="de-DE" dirty="0"/>
+              <a:t>API Clients</a:t>
+            </a:r>
+          </a:p>
+        </p:txBody>
+      </p:sp>
+      <p:sp>
+        <p:nvSpPr>
+          <p:cNvPr id="41" name="Abgerundetes Rechteck 40"/>
+          <p:cNvSpPr/>
+          <p:nvPr/>
+        </p:nvSpPr>
+        <p:spPr>
+          <a:xfrm>
+            <a:off x="1434127" y="4188325"/>
+            <a:ext cx="4043549" cy="266700"/>
+          </a:xfrm>
+          <a:prstGeom prst="roundRect">
+            <a:avLst/>
+          </a:prstGeom>
+        </p:spPr>
+        <p:style>
+          <a:lnRef idx="2">
+            <a:schemeClr val="accent1">
+              <a:shade val="50000"/>
+            </a:schemeClr>
+          </a:lnRef>
+          <a:fillRef idx="1">
+            <a:schemeClr val="accent1"/>
+          </a:fillRef>
+          <a:effectRef idx="0">
+            <a:schemeClr val="accent1"/>
+          </a:effectRef>
+          <a:fontRef idx="minor">
+            <a:schemeClr val="lt1"/>
+          </a:fontRef>
+        </p:style>
+        <p:txBody>
+          <a:bodyPr rtlCol="0" anchor="ctr"/>
+          <a:lstStyle/>
+          <a:p>
+            <a:pPr algn="ctr"/>
+            <a:r>
+              <a:rPr lang="de-DE" sz="1400" dirty="0"/>
+              <a:t>I18n</a:t>
+            </a:r>
+          </a:p>
+        </p:txBody>
+      </p:sp>
+      <p:sp>
+        <p:nvSpPr>
+          <p:cNvPr id="2" name="Abgerundetes Rechteck 29">
+            <a:extLst>
+              <a:ext uri="{FF2B5EF4-FFF2-40B4-BE49-F238E27FC236}">
+                <a16:creationId xmlns:a16="http://schemas.microsoft.com/office/drawing/2014/main" id="{7656E4F8-9397-9A29-6218-35AC4B39F317}"/>
+              </a:ext>
+            </a:extLst>
+          </p:cNvPr>
+          <p:cNvSpPr/>
+          <p:nvPr/>
+        </p:nvSpPr>
+        <p:spPr>
+          <a:xfrm>
+            <a:off x="5959688" y="517388"/>
+            <a:ext cx="2569339" cy="583101"/>
+          </a:xfrm>
+          <a:prstGeom prst="roundRect">
+            <a:avLst/>
+          </a:prstGeom>
+        </p:spPr>
+        <p:style>
+          <a:lnRef idx="2">
+            <a:schemeClr val="accent3">
+              <a:shade val="50000"/>
+            </a:schemeClr>
+          </a:lnRef>
+          <a:fillRef idx="1">
+            <a:schemeClr val="accent3"/>
+          </a:fillRef>
+          <a:effectRef idx="0">
+            <a:schemeClr val="accent3"/>
+          </a:effectRef>
+          <a:fontRef idx="minor">
+            <a:schemeClr val="lt1"/>
+          </a:fontRef>
+        </p:style>
+        <p:txBody>
+          <a:bodyPr rtlCol="0" anchor="ctr"/>
+          <a:lstStyle/>
+          <a:p>
+            <a:pPr algn="ctr"/>
+            <a:r>
+              <a:rPr lang="de-DE" dirty="0"/>
+              <a:t>Frontend Applications</a:t>
+            </a:r>
+          </a:p>
+        </p:txBody>
+      </p:sp>
+      <p:sp>
+        <p:nvSpPr>
+          <p:cNvPr id="5" name="Abgerundetes Rechteck 29">
+            <a:extLst>
+              <a:ext uri="{FF2B5EF4-FFF2-40B4-BE49-F238E27FC236}">
+                <a16:creationId xmlns:a16="http://schemas.microsoft.com/office/drawing/2014/main" id="{7FABFF02-E73E-3837-012F-87CF17280639}"/>
+              </a:ext>
+            </a:extLst>
+          </p:cNvPr>
+          <p:cNvSpPr/>
+          <p:nvPr/>
+        </p:nvSpPr>
+        <p:spPr>
+          <a:xfrm>
+            <a:off x="8779923" y="517388"/>
+            <a:ext cx="2569339" cy="583101"/>
+          </a:xfrm>
+          <a:prstGeom prst="roundRect">
+            <a:avLst/>
+          </a:prstGeom>
+        </p:spPr>
+        <p:style>
+          <a:lnRef idx="2">
+            <a:schemeClr val="accent3">
+              <a:shade val="50000"/>
+            </a:schemeClr>
+          </a:lnRef>
+          <a:fillRef idx="1">
+            <a:schemeClr val="accent3"/>
+          </a:fillRef>
+          <a:effectRef idx="0">
+            <a:schemeClr val="accent3"/>
+          </a:effectRef>
+          <a:fontRef idx="minor">
+            <a:schemeClr val="lt1"/>
+          </a:fontRef>
+        </p:style>
+        <p:txBody>
+          <a:bodyPr rtlCol="0" anchor="ctr"/>
+          <a:lstStyle/>
+          <a:p>
+            <a:pPr algn="ctr"/>
+            <a:r>
+              <a:rPr lang="de-DE" dirty="0"/>
+              <a:t>CLI Commands</a:t>
+            </a:r>
+          </a:p>
+        </p:txBody>
+      </p:sp>
+      <p:sp>
+        <p:nvSpPr>
+          <p:cNvPr id="24" name="Abgerundetes Rechteck 12">
+            <a:extLst>
+              <a:ext uri="{FF2B5EF4-FFF2-40B4-BE49-F238E27FC236}">
+                <a16:creationId xmlns:a16="http://schemas.microsoft.com/office/drawing/2014/main" id="{CE5A7A8C-1B74-875F-A67D-38AE7764B912}"/>
+              </a:ext>
+            </a:extLst>
+          </p:cNvPr>
+          <p:cNvSpPr/>
+          <p:nvPr/>
+        </p:nvSpPr>
+        <p:spPr>
+          <a:xfrm>
+            <a:off x="7415686" y="2155557"/>
+            <a:ext cx="3950925" cy="1329473"/>
+          </a:xfrm>
+          <a:prstGeom prst="roundRect">
+            <a:avLst/>
+          </a:prstGeom>
+          <a:solidFill>
+            <a:schemeClr val="accent2">
+              <a:lumMod val="60000"/>
+              <a:lumOff val="40000"/>
+              <a:alpha val="50000"/>
+            </a:schemeClr>
+          </a:solidFill>
+          <a:ln w="9525" cap="flat" cmpd="sng" algn="ctr">
+            <a:solidFill>
+              <a:schemeClr val="accent5"/>
+            </a:solidFill>
+            <a:prstDash val="solid"/>
+            <a:round/>
+            <a:headEnd type="none" w="med" len="med"/>
+            <a:tailEnd type="none" w="med" len="med"/>
+          </a:ln>
+        </p:spPr>
+        <p:style>
+          <a:lnRef idx="0">
+            <a:scrgbClr r="0" g="0" b="0"/>
+          </a:lnRef>
+          <a:fillRef idx="0">
+            <a:scrgbClr r="0" g="0" b="0"/>
+          </a:fillRef>
+          <a:effectRef idx="0">
+            <a:scrgbClr r="0" g="0" b="0"/>
+          </a:effectRef>
+          <a:fontRef idx="minor">
+            <a:schemeClr val="accent5"/>
+          </a:fontRef>
+        </p:style>
+        <p:txBody>
+          <a:bodyPr vert="vert270" rtlCol="0" anchor="t" anchorCtr="1"/>
+          <a:lstStyle/>
+          <a:p>
+            <a:pPr algn="ctr"/>
+            <a:r>
+              <a:rPr lang="de-DE" dirty="0">
+                <a:solidFill>
+                  <a:schemeClr val="accent2">
+                    <a:lumMod val="75000"/>
+                  </a:schemeClr>
+                </a:solidFill>
+              </a:rPr>
+              <a:t>Custom Extensions</a:t>
+            </a:r>
+          </a:p>
+        </p:txBody>
+      </p:sp>
+      <p:sp>
+        <p:nvSpPr>
+          <p:cNvPr id="28" name="Abgerundetes Rechteck 6">
+            <a:extLst>
+              <a:ext uri="{FF2B5EF4-FFF2-40B4-BE49-F238E27FC236}">
+                <a16:creationId xmlns:a16="http://schemas.microsoft.com/office/drawing/2014/main" id="{668D14B1-F0F0-BC46-26D5-CC828E0916A6}"/>
+              </a:ext>
+            </a:extLst>
+          </p:cNvPr>
+          <p:cNvSpPr/>
+          <p:nvPr/>
+        </p:nvSpPr>
+        <p:spPr>
+          <a:xfrm>
+            <a:off x="290329" y="2162361"/>
+            <a:ext cx="6991547" cy="1329473"/>
+          </a:xfrm>
+          <a:prstGeom prst="roundRect">
+            <a:avLst/>
+          </a:prstGeom>
+          <a:solidFill>
+            <a:schemeClr val="accent1">
+              <a:lumMod val="20000"/>
+              <a:lumOff val="80000"/>
+            </a:schemeClr>
+          </a:solidFill>
+        </p:spPr>
+        <p:style>
+          <a:lnRef idx="2">
+            <a:schemeClr val="accent1">
+              <a:shade val="50000"/>
+            </a:schemeClr>
+          </a:lnRef>
+          <a:fillRef idx="1">
+            <a:schemeClr val="accent1"/>
+          </a:fillRef>
+          <a:effectRef idx="0">
+            <a:schemeClr val="accent1"/>
+          </a:effectRef>
+          <a:fontRef idx="minor">
+            <a:schemeClr val="lt1"/>
+          </a:fontRef>
+        </p:style>
+        <p:txBody>
+          <a:bodyPr vert="vert270" rtlCol="0" anchor="t" anchorCtr="0"/>
+          <a:lstStyle/>
+          <a:p>
+            <a:pPr algn="ctr"/>
+            <a:r>
+              <a:rPr lang="de-DE" dirty="0">
+                <a:solidFill>
+                  <a:schemeClr val="accent5"/>
+                </a:solidFill>
+              </a:rPr>
+              <a:t>Core Extensions</a:t>
+            </a:r>
+          </a:p>
+        </p:txBody>
+      </p:sp>
+      <p:grpSp>
+        <p:nvGrpSpPr>
+          <p:cNvPr id="56" name="Group 55">
+            <a:extLst>
+              <a:ext uri="{FF2B5EF4-FFF2-40B4-BE49-F238E27FC236}">
+                <a16:creationId xmlns:a16="http://schemas.microsoft.com/office/drawing/2014/main" id="{114D7CE0-7921-BA35-628E-AFA6153A7F29}"/>
+              </a:ext>
+            </a:extLst>
+          </p:cNvPr>
+          <p:cNvGrpSpPr/>
+          <p:nvPr/>
+        </p:nvGrpSpPr>
+        <p:grpSpPr>
+          <a:xfrm>
+            <a:off x="1293054" y="1317210"/>
+            <a:ext cx="5645524" cy="2051446"/>
+            <a:chOff x="1050868" y="1317208"/>
+            <a:chExt cx="5645524" cy="2051446"/>
+          </a:xfrm>
+        </p:grpSpPr>
+        <p:sp>
+          <p:nvSpPr>
+            <p:cNvPr id="6" name="Abgerundetes Rechteck 24">
+              <a:extLst>
+                <a:ext uri="{FF2B5EF4-FFF2-40B4-BE49-F238E27FC236}">
+                  <a16:creationId xmlns:a16="http://schemas.microsoft.com/office/drawing/2014/main" id="{06FA1C14-659C-BEB8-764C-A1A85C2CE62D}"/>
+                </a:ext>
+              </a:extLst>
+            </p:cNvPr>
+            <p:cNvSpPr/>
+            <p:nvPr/>
+          </p:nvSpPr>
+          <p:spPr>
+            <a:xfrm rot="16200000">
+              <a:off x="1211392" y="2001626"/>
+              <a:ext cx="2039112" cy="694944"/>
+            </a:xfrm>
+            <a:prstGeom prst="roundRect">
+              <a:avLst/>
+            </a:prstGeom>
+          </p:spPr>
+          <p:style>
+            <a:lnRef idx="2">
+              <a:schemeClr val="accent1">
+                <a:shade val="50000"/>
+              </a:schemeClr>
+            </a:lnRef>
+            <a:fillRef idx="1">
+              <a:schemeClr val="accent1"/>
+            </a:fillRef>
+            <a:effectRef idx="0">
+              <a:schemeClr val="accent1"/>
+            </a:effectRef>
+            <a:fontRef idx="minor">
+              <a:schemeClr val="lt1"/>
+            </a:fontRef>
+          </p:style>
+          <p:txBody>
+            <a:bodyPr rtlCol="0" anchor="ctr"/>
+            <a:lstStyle/>
+            <a:p>
+              <a:pPr algn="ctr"/>
+              <a:r>
+                <a:rPr lang="de-DE" dirty="0">
+                  <a:solidFill>
+                    <a:schemeClr val="bg1"/>
+                  </a:solidFill>
+                </a:rPr>
+                <a:t>Datahub APIs</a:t>
+              </a:r>
+            </a:p>
+          </p:txBody>
+        </p:sp>
+        <p:sp>
+          <p:nvSpPr>
+            <p:cNvPr id="25" name="Abgerundetes Rechteck 24"/>
+            <p:cNvSpPr/>
+            <p:nvPr/>
+          </p:nvSpPr>
+          <p:spPr>
+            <a:xfrm rot="16200000">
+              <a:off x="379337" y="2002178"/>
+              <a:ext cx="2038006" cy="694944"/>
+            </a:xfrm>
+            <a:prstGeom prst="roundRect">
+              <a:avLst/>
+            </a:prstGeom>
+          </p:spPr>
+          <p:style>
+            <a:lnRef idx="2">
+              <a:schemeClr val="accent1">
+                <a:shade val="50000"/>
+              </a:schemeClr>
+            </a:lnRef>
+            <a:fillRef idx="1">
+              <a:schemeClr val="accent1"/>
+            </a:fillRef>
+            <a:effectRef idx="0">
+              <a:schemeClr val="accent1"/>
+            </a:effectRef>
+            <a:fontRef idx="minor">
+              <a:schemeClr val="lt1"/>
+            </a:fontRef>
+          </p:style>
+          <p:txBody>
+            <a:bodyPr rtlCol="0" anchor="ctr"/>
+            <a:lstStyle/>
+            <a:p>
+              <a:pPr algn="ctr"/>
+              <a:r>
+                <a:rPr lang="de-DE" dirty="0">
+                  <a:solidFill>
+                    <a:schemeClr val="bg1"/>
+                  </a:solidFill>
+                </a:rPr>
+                <a:t>Admin Backend</a:t>
+              </a:r>
+            </a:p>
+          </p:txBody>
+        </p:sp>
+        <p:sp>
+          <p:nvSpPr>
+            <p:cNvPr id="44" name="Abgerundetes Rechteck 24">
+              <a:extLst>
+                <a:ext uri="{FF2B5EF4-FFF2-40B4-BE49-F238E27FC236}">
+                  <a16:creationId xmlns:a16="http://schemas.microsoft.com/office/drawing/2014/main" id="{261E03B6-7F0E-2955-B4B6-B8CD9128A400}"/>
+                </a:ext>
+              </a:extLst>
+            </p:cNvPr>
+            <p:cNvSpPr/>
+            <p:nvPr/>
+          </p:nvSpPr>
+          <p:spPr>
+            <a:xfrm rot="16200000">
+              <a:off x="4506578" y="2001625"/>
+              <a:ext cx="2039112" cy="694944"/>
+            </a:xfrm>
+            <a:prstGeom prst="roundRect">
+              <a:avLst/>
+            </a:prstGeom>
+          </p:spPr>
+          <p:style>
+            <a:lnRef idx="2">
+              <a:schemeClr val="accent1">
+                <a:shade val="50000"/>
+              </a:schemeClr>
+            </a:lnRef>
+            <a:fillRef idx="1">
+              <a:schemeClr val="accent1"/>
+            </a:fillRef>
+            <a:effectRef idx="0">
+              <a:schemeClr val="accent1"/>
+            </a:effectRef>
+            <a:fontRef idx="minor">
+              <a:schemeClr val="lt1"/>
+            </a:fontRef>
+          </p:style>
+          <p:txBody>
+            <a:bodyPr rtlCol="0" anchor="ctr"/>
+            <a:lstStyle/>
+            <a:p>
+              <a:pPr algn="ctr"/>
+              <a:r>
+                <a:rPr lang="de-DE" dirty="0">
+                  <a:solidFill>
+                    <a:schemeClr val="bg1"/>
+                  </a:solidFill>
+                </a:rPr>
+                <a:t>Personalization</a:t>
+              </a:r>
+            </a:p>
+          </p:txBody>
+        </p:sp>
+        <p:sp>
+          <p:nvSpPr>
+            <p:cNvPr id="45" name="Abgerundetes Rechteck 24">
+              <a:extLst>
+                <a:ext uri="{FF2B5EF4-FFF2-40B4-BE49-F238E27FC236}">
+                  <a16:creationId xmlns:a16="http://schemas.microsoft.com/office/drawing/2014/main" id="{C8472DAC-D5E3-8802-9E88-B173E401206D}"/>
+                </a:ext>
+              </a:extLst>
+            </p:cNvPr>
+            <p:cNvSpPr/>
+            <p:nvPr/>
+          </p:nvSpPr>
+          <p:spPr>
+            <a:xfrm rot="16200000">
+              <a:off x="3683793" y="2001625"/>
+              <a:ext cx="2039112" cy="694944"/>
+            </a:xfrm>
+            <a:prstGeom prst="roundRect">
+              <a:avLst/>
+            </a:prstGeom>
+          </p:spPr>
+          <p:style>
+            <a:lnRef idx="2">
+              <a:schemeClr val="accent1">
+                <a:shade val="50000"/>
+              </a:schemeClr>
+            </a:lnRef>
+            <a:fillRef idx="1">
+              <a:schemeClr val="accent1"/>
+            </a:fillRef>
+            <a:effectRef idx="0">
+              <a:schemeClr val="accent1"/>
+            </a:effectRef>
+            <a:fontRef idx="minor">
+              <a:schemeClr val="lt1"/>
+            </a:fontRef>
+          </p:style>
+          <p:txBody>
+            <a:bodyPr rtlCol="0" anchor="ctr"/>
+            <a:lstStyle/>
+            <a:p>
+              <a:pPr algn="ctr"/>
+              <a:r>
+                <a:rPr lang="de-DE" dirty="0">
+                  <a:solidFill>
+                    <a:schemeClr val="bg1"/>
+                  </a:solidFill>
+                </a:rPr>
+                <a:t>Reporting</a:t>
+              </a:r>
+            </a:p>
+          </p:txBody>
+        </p:sp>
+        <p:sp>
+          <p:nvSpPr>
+            <p:cNvPr id="46" name="Abgerundetes Rechteck 24">
+              <a:extLst>
+                <a:ext uri="{FF2B5EF4-FFF2-40B4-BE49-F238E27FC236}">
+                  <a16:creationId xmlns:a16="http://schemas.microsoft.com/office/drawing/2014/main" id="{789A90A7-C8EA-71EA-2955-EEE6B6F95734}"/>
+                </a:ext>
+              </a:extLst>
+            </p:cNvPr>
+            <p:cNvSpPr/>
+            <p:nvPr/>
+          </p:nvSpPr>
+          <p:spPr>
+            <a:xfrm rot="16200000">
+              <a:off x="2861149" y="1992373"/>
+              <a:ext cx="2035243" cy="694694"/>
+            </a:xfrm>
+            <a:prstGeom prst="roundRect">
+              <a:avLst/>
+            </a:prstGeom>
+          </p:spPr>
+          <p:style>
+            <a:lnRef idx="2">
+              <a:schemeClr val="accent1">
+                <a:shade val="50000"/>
+              </a:schemeClr>
+            </a:lnRef>
+            <a:fillRef idx="1">
+              <a:schemeClr val="accent1"/>
+            </a:fillRef>
+            <a:effectRef idx="0">
+              <a:schemeClr val="accent1"/>
+            </a:effectRef>
+            <a:fontRef idx="minor">
+              <a:schemeClr val="lt1"/>
+            </a:fontRef>
+          </p:style>
+          <p:txBody>
+            <a:bodyPr rtlCol="0" anchor="ctr"/>
+            <a:lstStyle/>
+            <a:p>
+              <a:pPr algn="ctr"/>
+              <a:r>
+                <a:rPr lang="de-DE" dirty="0">
+                  <a:solidFill>
+                    <a:schemeClr val="bg1"/>
+                  </a:solidFill>
+                </a:rPr>
+                <a:t>E-Commerce Framework</a:t>
+              </a:r>
+            </a:p>
+          </p:txBody>
+        </p:sp>
+        <p:sp>
+          <p:nvSpPr>
+            <p:cNvPr id="47" name="Abgerundetes Rechteck 24">
+              <a:extLst>
+                <a:ext uri="{FF2B5EF4-FFF2-40B4-BE49-F238E27FC236}">
+                  <a16:creationId xmlns:a16="http://schemas.microsoft.com/office/drawing/2014/main" id="{4D5E8603-4512-4C6B-867F-689E7CD97947}"/>
+                </a:ext>
+              </a:extLst>
+            </p:cNvPr>
+            <p:cNvSpPr/>
+            <p:nvPr/>
+          </p:nvSpPr>
+          <p:spPr>
+            <a:xfrm rot="16200000">
+              <a:off x="2037503" y="1989803"/>
+              <a:ext cx="2040133" cy="694944"/>
+            </a:xfrm>
+            <a:prstGeom prst="roundRect">
+              <a:avLst/>
+            </a:prstGeom>
+          </p:spPr>
+          <p:style>
+            <a:lnRef idx="2">
+              <a:schemeClr val="accent1">
+                <a:shade val="50000"/>
+              </a:schemeClr>
+            </a:lnRef>
+            <a:fillRef idx="1">
+              <a:schemeClr val="accent1"/>
+            </a:fillRef>
+            <a:effectRef idx="0">
+              <a:schemeClr val="accent1"/>
+            </a:effectRef>
+            <a:fontRef idx="minor">
+              <a:schemeClr val="lt1"/>
+            </a:fontRef>
+          </p:style>
+          <p:txBody>
+            <a:bodyPr rtlCol="0" anchor="ctr"/>
+            <a:lstStyle/>
+            <a:p>
+              <a:pPr algn="ctr"/>
+              <a:r>
+                <a:rPr lang="de-DE" dirty="0">
+                  <a:solidFill>
+                    <a:schemeClr val="bg1"/>
+                  </a:solidFill>
+                </a:rPr>
+                <a:t>Portal Engine</a:t>
+              </a:r>
+            </a:p>
+          </p:txBody>
+        </p:sp>
+        <p:sp>
+          <p:nvSpPr>
+            <p:cNvPr id="54" name="Abgerundetes Rechteck 24">
+              <a:extLst>
+                <a:ext uri="{FF2B5EF4-FFF2-40B4-BE49-F238E27FC236}">
+                  <a16:creationId xmlns:a16="http://schemas.microsoft.com/office/drawing/2014/main" id="{D128623B-C7AD-C7BA-C3E5-DCC59BC45C9A}"/>
+                </a:ext>
+              </a:extLst>
+            </p:cNvPr>
+            <p:cNvSpPr/>
+            <p:nvPr/>
+          </p:nvSpPr>
+          <p:spPr>
+            <a:xfrm rot="16200000">
+              <a:off x="5329364" y="2001625"/>
+              <a:ext cx="2039112" cy="694944"/>
+            </a:xfrm>
+            <a:prstGeom prst="roundRect">
+              <a:avLst/>
+            </a:prstGeom>
+          </p:spPr>
+          <p:style>
+            <a:lnRef idx="2">
+              <a:schemeClr val="accent1">
+                <a:shade val="50000"/>
+              </a:schemeClr>
+            </a:lnRef>
+            <a:fillRef idx="1">
+              <a:schemeClr val="accent1"/>
+            </a:fillRef>
+            <a:effectRef idx="0">
+              <a:schemeClr val="accent1"/>
+            </a:effectRef>
+            <a:fontRef idx="minor">
+              <a:schemeClr val="lt1"/>
+            </a:fontRef>
+          </p:style>
+          <p:txBody>
+            <a:bodyPr rtlCol="0" anchor="ctr"/>
+            <a:lstStyle/>
+            <a:p>
+              <a:pPr algn="ctr"/>
+              <a:r>
+                <a:rPr lang="de-DE" dirty="0">
+                  <a:solidFill>
+                    <a:schemeClr val="bg1"/>
+                  </a:solidFill>
+                </a:rPr>
+                <a:t>And many more…</a:t>
+              </a:r>
+            </a:p>
+          </p:txBody>
+        </p:sp>
+      </p:grpSp>
+      <p:sp>
+        <p:nvSpPr>
+          <p:cNvPr id="50" name="Abgerundetes Rechteck 24">
+            <a:extLst>
+              <a:ext uri="{FF2B5EF4-FFF2-40B4-BE49-F238E27FC236}">
+                <a16:creationId xmlns:a16="http://schemas.microsoft.com/office/drawing/2014/main" id="{1E34A601-8D44-D0F1-A5E5-DD6D57E599E5}"/>
+              </a:ext>
+            </a:extLst>
+          </p:cNvPr>
+          <p:cNvSpPr/>
+          <p:nvPr/>
+        </p:nvSpPr>
+        <p:spPr>
+          <a:xfrm rot="16200000">
+            <a:off x="9953789" y="2354210"/>
+            <a:ext cx="1106965" cy="921925"/>
+          </a:xfrm>
+          <a:prstGeom prst="roundRect">
+            <a:avLst/>
+          </a:prstGeom>
+          <a:solidFill>
+            <a:srgbClr val="F1A069"/>
+          </a:solidFill>
+        </p:spPr>
+        <p:style>
+          <a:lnRef idx="2">
+            <a:schemeClr val="accent1">
+              <a:shade val="50000"/>
+            </a:schemeClr>
+          </a:lnRef>
+          <a:fillRef idx="1">
+            <a:schemeClr val="accent1"/>
+          </a:fillRef>
+          <a:effectRef idx="0">
+            <a:schemeClr val="accent1"/>
+          </a:effectRef>
+          <a:fontRef idx="minor">
+            <a:schemeClr val="lt1"/>
+          </a:fontRef>
+        </p:style>
+        <p:txBody>
+          <a:bodyPr rtlCol="0" anchor="ctr"/>
+          <a:lstStyle/>
+          <a:p>
+            <a:pPr algn="ctr"/>
+            <a:r>
+              <a:rPr lang="de-DE" dirty="0">
+                <a:solidFill>
+                  <a:schemeClr val="bg1"/>
+                </a:solidFill>
+              </a:rPr>
+              <a:t>Custom Bundles</a:t>
+            </a:r>
+          </a:p>
+        </p:txBody>
+      </p:sp>
+      <p:sp>
+        <p:nvSpPr>
+          <p:cNvPr id="48" name="Abgerundetes Rechteck 24">
+            <a:extLst>
+              <a:ext uri="{FF2B5EF4-FFF2-40B4-BE49-F238E27FC236}">
+                <a16:creationId xmlns:a16="http://schemas.microsoft.com/office/drawing/2014/main" id="{3A6B3208-4362-3F29-E129-AC2C382876AB}"/>
+              </a:ext>
+            </a:extLst>
+          </p:cNvPr>
+          <p:cNvSpPr/>
+          <p:nvPr/>
+        </p:nvSpPr>
+        <p:spPr>
+          <a:xfrm rot="16200000">
+            <a:off x="7740487" y="2014462"/>
+            <a:ext cx="2019617" cy="694944"/>
+          </a:xfrm>
+          <a:prstGeom prst="roundRect">
+            <a:avLst/>
+          </a:prstGeom>
+          <a:solidFill>
+            <a:srgbClr val="F1A069"/>
+          </a:solidFill>
+        </p:spPr>
+        <p:style>
+          <a:lnRef idx="2">
+            <a:schemeClr val="accent1">
+              <a:shade val="50000"/>
+            </a:schemeClr>
+          </a:lnRef>
+          <a:fillRef idx="1">
+            <a:schemeClr val="accent1"/>
+          </a:fillRef>
+          <a:effectRef idx="0">
+            <a:schemeClr val="accent1"/>
+          </a:effectRef>
+          <a:fontRef idx="minor">
+            <a:schemeClr val="lt1"/>
+          </a:fontRef>
+        </p:style>
+        <p:txBody>
+          <a:bodyPr rtlCol="0" anchor="ctr"/>
+          <a:lstStyle/>
+          <a:p>
+            <a:pPr algn="ctr"/>
+            <a:r>
+              <a:rPr lang="de-DE" dirty="0">
+                <a:solidFill>
+                  <a:schemeClr val="bg1"/>
+                </a:solidFill>
+              </a:rPr>
+              <a:t>Apps / Website</a:t>
+            </a:r>
+          </a:p>
+        </p:txBody>
+      </p:sp>
+      <p:sp>
+        <p:nvSpPr>
+          <p:cNvPr id="49" name="Abgerundetes Rechteck 24">
+            <a:extLst>
+              <a:ext uri="{FF2B5EF4-FFF2-40B4-BE49-F238E27FC236}">
+                <a16:creationId xmlns:a16="http://schemas.microsoft.com/office/drawing/2014/main" id="{BCFFC700-ACE6-F81C-2CE0-AC0BE60F863E}"/>
+              </a:ext>
+            </a:extLst>
+          </p:cNvPr>
+          <p:cNvSpPr/>
+          <p:nvPr/>
+        </p:nvSpPr>
+        <p:spPr>
+          <a:xfrm rot="16200000">
+            <a:off x="8560602" y="2014462"/>
+            <a:ext cx="2019618" cy="694944"/>
+          </a:xfrm>
+          <a:prstGeom prst="roundRect">
+            <a:avLst/>
+          </a:prstGeom>
+          <a:solidFill>
+            <a:srgbClr val="F1A069"/>
+          </a:solidFill>
+        </p:spPr>
+        <p:style>
+          <a:lnRef idx="2">
+            <a:schemeClr val="accent1">
+              <a:shade val="50000"/>
+            </a:schemeClr>
+          </a:lnRef>
+          <a:fillRef idx="1">
+            <a:schemeClr val="accent1"/>
+          </a:fillRef>
+          <a:effectRef idx="0">
+            <a:schemeClr val="accent1"/>
+          </a:effectRef>
+          <a:fontRef idx="minor">
+            <a:schemeClr val="lt1"/>
+          </a:fontRef>
+        </p:style>
+        <p:txBody>
+          <a:bodyPr rtlCol="0" anchor="ctr"/>
+          <a:lstStyle/>
+          <a:p>
+            <a:pPr algn="ctr"/>
+            <a:r>
+              <a:rPr lang="de-DE" dirty="0">
+                <a:solidFill>
+                  <a:schemeClr val="bg1"/>
+                </a:solidFill>
+              </a:rPr>
+              <a:t>Custom Bundles</a:t>
+            </a:r>
+          </a:p>
+        </p:txBody>
+      </p:sp>
+      <p:sp>
+        <p:nvSpPr>
+          <p:cNvPr id="55" name="Abgerundetes Rechteck 11">
+            <a:extLst>
+              <a:ext uri="{FF2B5EF4-FFF2-40B4-BE49-F238E27FC236}">
+                <a16:creationId xmlns:a16="http://schemas.microsoft.com/office/drawing/2014/main" id="{ED0DF809-1B6F-410C-324B-7BEDBED66E46}"/>
+              </a:ext>
+            </a:extLst>
+          </p:cNvPr>
+          <p:cNvSpPr/>
+          <p:nvPr/>
+        </p:nvSpPr>
+        <p:spPr>
+          <a:xfrm>
+            <a:off x="8793987" y="5628198"/>
+            <a:ext cx="2569339" cy="876300"/>
+          </a:xfrm>
+          <a:prstGeom prst="roundRect">
+            <a:avLst/>
+          </a:prstGeom>
+          <a:solidFill>
+            <a:schemeClr val="accent6"/>
+          </a:solidFill>
+        </p:spPr>
+        <p:style>
+          <a:lnRef idx="2">
+            <a:schemeClr val="accent1">
+              <a:shade val="50000"/>
+            </a:schemeClr>
+          </a:lnRef>
+          <a:fillRef idx="1">
+            <a:schemeClr val="accent1"/>
+          </a:fillRef>
+          <a:effectRef idx="0">
+            <a:schemeClr val="accent1"/>
+          </a:effectRef>
+          <a:fontRef idx="minor">
+            <a:schemeClr val="lt1"/>
+          </a:fontRef>
+        </p:style>
+        <p:txBody>
+          <a:bodyPr rtlCol="0" anchor="ctr"/>
+          <a:lstStyle/>
+          <a:p>
+            <a:pPr algn="ctr"/>
+            <a:r>
+              <a:rPr lang="de-DE" dirty="0"/>
+              <a:t>Search Indices</a:t>
+            </a:r>
+          </a:p>
+        </p:txBody>
+      </p:sp>
+    </p:spTree>
+    <p:extLst>
+      <p:ext uri="{BB962C8B-B14F-4D97-AF65-F5344CB8AC3E}">
+        <p14:creationId xmlns:p14="http://schemas.microsoft.com/office/powerpoint/2010/main" val="2217418032"/>
       </p:ext>
     </p:extLst>
   </p:cSld>

</xml_diff>